<commit_message>
Put report graphs instead of powerpoint one
</commit_message>
<xml_diff>
--- a/Presentation/Presentation.pptx
+++ b/Presentation/Presentation.pptx
@@ -25,1134 +25,11 @@
     <p:sldId id="268" r:id="rId18"/>
     <p:sldId id="269" r:id="rId19"/>
     <p:sldId id="270" r:id="rId20"/>
+    <p:sldId id="271" r:id="rId21"/>
   </p:sldIdLst>
   <p:sldSz cx="12192000" cy="6858000"/>
   <p:notesSz cx="6858000" cy="9144000"/>
 </p:presentation>
-</file>
-
-<file path=ppt/charts/chart1.xml><?xml version="1.0" encoding="utf-8"?>
-<c:chartSpace xmlns:a="http://schemas.openxmlformats.org/drawingml/2006/main" xmlns:c="http://schemas.openxmlformats.org/drawingml/2006/chart" xmlns:r="http://schemas.openxmlformats.org/officeDocument/2006/relationships">
-  <c:lang val="en-US"/>
-  <c:chart>
-    <c:plotArea>
-      <c:layout/>
-      <c:barChart>
-        <c:barDir val="col"/>
-        <c:grouping val="clustered"/>
-        <c:ser>
-          <c:idx val="0"/>
-          <c:order val="0"/>
-          <c:tx>
-            <c:strRef>
-              <c:f>label 1</c:f>
-              <c:strCache>
-                <c:ptCount val="1"/>
-                <c:pt idx="0">
-                  <c:v>Mean</c:v>
-                </c:pt>
-              </c:strCache>
-            </c:strRef>
-          </c:tx>
-          <c:spPr>
-            <a:solidFill>
-              <a:srgbClr val="e48312"/>
-            </a:solidFill>
-          </c:spPr>
-          <c:cat>
-            <c:strRef>
-              <c:f>categories</c:f>
-              <c:strCache>
-                <c:ptCount val="6"/>
-                <c:pt idx="0">
-                  <c:v>a</c:v>
-                </c:pt>
-                <c:pt idx="1">
-                  <c:v>b</c:v>
-                </c:pt>
-                <c:pt idx="2">
-                  <c:v>c</c:v>
-                </c:pt>
-                <c:pt idx="3">
-                  <c:v>d</c:v>
-                </c:pt>
-                <c:pt idx="4">
-                  <c:v>e</c:v>
-                </c:pt>
-                <c:pt idx="5">
-                  <c:v>f</c:v>
-                </c:pt>
-              </c:strCache>
-            </c:strRef>
-          </c:cat>
-          <c:val>
-            <c:numRef>
-              <c:f>0</c:f>
-              <c:numCache>
-                <c:formatCode>General</c:formatCode>
-                <c:ptCount val="6"/>
-                <c:pt idx="0">
-                  <c:v>0.1924999</c:v>
-                </c:pt>
-                <c:pt idx="1">
-                  <c:v>0.090277825</c:v>
-                </c:pt>
-                <c:pt idx="2">
-                  <c:v>0.187083225</c:v>
-                </c:pt>
-                <c:pt idx="3">
-                  <c:v>0.18569445</c:v>
-                </c:pt>
-                <c:pt idx="4">
-                  <c:v>0.20486105</c:v>
-                </c:pt>
-                <c:pt idx="5">
-                  <c:v>0.1379167</c:v>
-                </c:pt>
-              </c:numCache>
-            </c:numRef>
-          </c:val>
-        </c:ser>
-        <c:gapWidth val="219"/>
-        <c:axId val="1620362"/>
-        <c:axId val="48285936"/>
-      </c:barChart>
-      <c:catAx>
-        <c:axId val="1620362"/>
-        <c:scaling>
-          <c:orientation val="minMax"/>
-        </c:scaling>
-        <c:delete val="1"/>
-        <c:axPos val="b"/>
-        <c:majorTickMark val="out"/>
-        <c:minorTickMark val="none"/>
-        <c:tickLblPos val="nextTo"/>
-        <c:crossAx val="48285936"/>
-        <c:crossesAt val="0"/>
-        <c:lblAlgn val="ctr"/>
-        <c:auto val="1"/>
-        <c:lblOffset val="100"/>
-        <c:spPr>
-          <a:ln w="12600">
-            <a:solidFill>
-              <a:srgbClr val="8b8b8b"/>
-            </a:solidFill>
-            <a:round/>
-          </a:ln>
-        </c:spPr>
-      </c:catAx>
-      <c:valAx>
-        <c:axId val="48285936"/>
-        <c:scaling>
-          <c:orientation val="minMax"/>
-        </c:scaling>
-        <c:delete val="1"/>
-        <c:axPos val="l"/>
-        <c:majorTickMark val="out"/>
-        <c:minorTickMark val="none"/>
-        <c:tickLblPos val="nextTo"/>
-        <c:crossAx val="1620362"/>
-        <c:crossesAt val="0"/>
-        <c:spPr>
-          <a:ln w="12600">
-            <a:solidFill>
-              <a:srgbClr val="8b8b8b"/>
-            </a:solidFill>
-            <a:round/>
-          </a:ln>
-        </c:spPr>
-      </c:valAx>
-      <c:spPr/>
-    </c:plotArea>
-    <c:plotVisOnly val="1"/>
-  </c:chart>
-  <c:spPr>
-    <a:solidFill>
-      <a:srgbClr val="ffffff"/>
-    </a:solidFill>
-    <a:ln w="12600">
-      <a:solidFill>
-        <a:srgbClr val="000000"/>
-      </a:solidFill>
-      <a:round/>
-    </a:ln>
-  </c:spPr>
-</c:chartSpace>
-</file>
-
-<file path=ppt/charts/chart2.xml><?xml version="1.0" encoding="utf-8"?>
-<c:chartSpace xmlns:a="http://schemas.openxmlformats.org/drawingml/2006/main" xmlns:c="http://schemas.openxmlformats.org/drawingml/2006/chart" xmlns:r="http://schemas.openxmlformats.org/officeDocument/2006/relationships">
-  <c:lang val="en-US"/>
-  <c:chart>
-    <c:plotArea>
-      <c:layout/>
-      <c:barChart>
-        <c:barDir val="col"/>
-        <c:grouping val="clustered"/>
-        <c:ser>
-          <c:idx val="0"/>
-          <c:order val="0"/>
-          <c:tx>
-            <c:strRef>
-              <c:f>label 1</c:f>
-              <c:strCache>
-                <c:ptCount val="1"/>
-                <c:pt idx="0">
-                  <c:v>Mean</c:v>
-                </c:pt>
-              </c:strCache>
-            </c:strRef>
-          </c:tx>
-          <c:spPr>
-            <a:solidFill>
-              <a:srgbClr val="bd582c"/>
-            </a:solidFill>
-          </c:spPr>
-          <c:cat>
-            <c:strRef>
-              <c:f>categories</c:f>
-              <c:strCache>
-                <c:ptCount val="6"/>
-                <c:pt idx="0">
-                  <c:v>a</c:v>
-                </c:pt>
-                <c:pt idx="1">
-                  <c:v>b</c:v>
-                </c:pt>
-                <c:pt idx="2">
-                  <c:v>c</c:v>
-                </c:pt>
-                <c:pt idx="3">
-                  <c:v>d</c:v>
-                </c:pt>
-                <c:pt idx="4">
-                  <c:v>e</c:v>
-                </c:pt>
-                <c:pt idx="5">
-                  <c:v>f</c:v>
-                </c:pt>
-              </c:strCache>
-            </c:strRef>
-          </c:cat>
-          <c:val>
-            <c:numRef>
-              <c:f>0</c:f>
-              <c:numCache>
-                <c:formatCode>General</c:formatCode>
-                <c:ptCount val="6"/>
-                <c:pt idx="0">
-                  <c:v>0.59347185</c:v>
-                </c:pt>
-                <c:pt idx="1">
-                  <c:v>0.697423775</c:v>
-                </c:pt>
-                <c:pt idx="2">
-                  <c:v>0.567714025</c:v>
-                </c:pt>
-                <c:pt idx="3">
-                  <c:v>0.60222455</c:v>
-                </c:pt>
-                <c:pt idx="4">
-                  <c:v>0.51332885</c:v>
-                </c:pt>
-                <c:pt idx="5">
-                  <c:v>0.6685032</c:v>
-                </c:pt>
-              </c:numCache>
-            </c:numRef>
-          </c:val>
-        </c:ser>
-        <c:gapWidth val="219"/>
-        <c:axId val="94936449"/>
-        <c:axId val="33536640"/>
-      </c:barChart>
-      <c:catAx>
-        <c:axId val="94936449"/>
-        <c:scaling>
-          <c:orientation val="minMax"/>
-        </c:scaling>
-        <c:delete val="1"/>
-        <c:axPos val="b"/>
-        <c:majorTickMark val="out"/>
-        <c:minorTickMark val="none"/>
-        <c:tickLblPos val="nextTo"/>
-        <c:crossAx val="33536640"/>
-        <c:crossesAt val="0"/>
-        <c:lblAlgn val="ctr"/>
-        <c:auto val="1"/>
-        <c:lblOffset val="100"/>
-        <c:spPr>
-          <a:ln w="12600">
-            <a:solidFill>
-              <a:srgbClr val="8b8b8b"/>
-            </a:solidFill>
-            <a:round/>
-          </a:ln>
-        </c:spPr>
-      </c:catAx>
-      <c:valAx>
-        <c:axId val="33536640"/>
-        <c:scaling>
-          <c:orientation val="minMax"/>
-        </c:scaling>
-        <c:delete val="1"/>
-        <c:axPos val="l"/>
-        <c:majorTickMark val="out"/>
-        <c:minorTickMark val="none"/>
-        <c:tickLblPos val="nextTo"/>
-        <c:crossAx val="94936449"/>
-        <c:crossesAt val="0"/>
-        <c:spPr>
-          <a:ln w="12600">
-            <a:solidFill>
-              <a:srgbClr val="8b8b8b"/>
-            </a:solidFill>
-            <a:round/>
-          </a:ln>
-        </c:spPr>
-      </c:valAx>
-      <c:spPr/>
-    </c:plotArea>
-    <c:plotVisOnly val="1"/>
-  </c:chart>
-  <c:spPr>
-    <a:solidFill>
-      <a:srgbClr val="ffffff"/>
-    </a:solidFill>
-    <a:ln w="12600">
-      <a:solidFill>
-        <a:srgbClr val="000000"/>
-      </a:solidFill>
-      <a:round/>
-    </a:ln>
-  </c:spPr>
-</c:chartSpace>
-</file>
-
-<file path=ppt/charts/chart3.xml><?xml version="1.0" encoding="utf-8"?>
-<c:chartSpace xmlns:a="http://schemas.openxmlformats.org/drawingml/2006/main" xmlns:c="http://schemas.openxmlformats.org/drawingml/2006/chart" xmlns:r="http://schemas.openxmlformats.org/officeDocument/2006/relationships">
-  <c:lang val="en-US"/>
-  <c:chart>
-    <c:plotArea>
-      <c:layout/>
-      <c:barChart>
-        <c:barDir val="col"/>
-        <c:grouping val="clustered"/>
-        <c:ser>
-          <c:idx val="0"/>
-          <c:order val="0"/>
-          <c:tx>
-            <c:strRef>
-              <c:f>label 1</c:f>
-              <c:strCache>
-                <c:ptCount val="1"/>
-                <c:pt idx="0">
-                  <c:v>Mean</c:v>
-                </c:pt>
-              </c:strCache>
-            </c:strRef>
-          </c:tx>
-          <c:spPr>
-            <a:solidFill>
-              <a:srgbClr val="e48312"/>
-            </a:solidFill>
-          </c:spPr>
-          <c:cat>
-            <c:strRef>
-              <c:f>categories</c:f>
-              <c:strCache>
-                <c:ptCount val="4"/>
-                <c:pt idx="0">
-                  <c:v>a</c:v>
-                </c:pt>
-                <c:pt idx="1">
-                  <c:v>b</c:v>
-                </c:pt>
-                <c:pt idx="2">
-                  <c:v>c</c:v>
-                </c:pt>
-                <c:pt idx="3">
-                  <c:v>d</c:v>
-                </c:pt>
-              </c:strCache>
-            </c:strRef>
-          </c:cat>
-          <c:val>
-            <c:numRef>
-              <c:f>0</c:f>
-              <c:numCache>
-                <c:formatCode>General</c:formatCode>
-                <c:ptCount val="4"/>
-                <c:pt idx="0">
-                  <c:v>0.19208335</c:v>
-                </c:pt>
-                <c:pt idx="1">
-                  <c:v>0.199166675</c:v>
-                </c:pt>
-                <c:pt idx="2">
-                  <c:v>0.193888925</c:v>
-                </c:pt>
-                <c:pt idx="3">
-                  <c:v>0.205138875</c:v>
-                </c:pt>
-              </c:numCache>
-            </c:numRef>
-          </c:val>
-        </c:ser>
-        <c:gapWidth val="219"/>
-        <c:axId val="17157775"/>
-        <c:axId val="26506534"/>
-      </c:barChart>
-      <c:catAx>
-        <c:axId val="17157775"/>
-        <c:scaling>
-          <c:orientation val="minMax"/>
-        </c:scaling>
-        <c:delete val="1"/>
-        <c:axPos val="b"/>
-        <c:majorTickMark val="out"/>
-        <c:minorTickMark val="none"/>
-        <c:tickLblPos val="nextTo"/>
-        <c:crossAx val="26506534"/>
-        <c:crossesAt val="0"/>
-        <c:lblAlgn val="ctr"/>
-        <c:auto val="1"/>
-        <c:lblOffset val="100"/>
-        <c:spPr>
-          <a:ln w="12600">
-            <a:solidFill>
-              <a:srgbClr val="8b8b8b"/>
-            </a:solidFill>
-            <a:round/>
-          </a:ln>
-        </c:spPr>
-      </c:catAx>
-      <c:valAx>
-        <c:axId val="26506534"/>
-        <c:scaling>
-          <c:orientation val="minMax"/>
-        </c:scaling>
-        <c:delete val="1"/>
-        <c:axPos val="l"/>
-        <c:majorTickMark val="out"/>
-        <c:minorTickMark val="none"/>
-        <c:tickLblPos val="nextTo"/>
-        <c:crossAx val="17157775"/>
-        <c:crossesAt val="0"/>
-        <c:spPr>
-          <a:ln w="12600">
-            <a:solidFill>
-              <a:srgbClr val="8b8b8b"/>
-            </a:solidFill>
-            <a:round/>
-          </a:ln>
-        </c:spPr>
-      </c:valAx>
-      <c:spPr/>
-    </c:plotArea>
-    <c:plotVisOnly val="1"/>
-  </c:chart>
-  <c:spPr>
-    <a:solidFill>
-      <a:srgbClr val="ffffff"/>
-    </a:solidFill>
-    <a:ln w="12600">
-      <a:solidFill>
-        <a:srgbClr val="000000"/>
-      </a:solidFill>
-      <a:round/>
-    </a:ln>
-  </c:spPr>
-</c:chartSpace>
-</file>
-
-<file path=ppt/charts/chart4.xml><?xml version="1.0" encoding="utf-8"?>
-<c:chartSpace xmlns:a="http://schemas.openxmlformats.org/drawingml/2006/main" xmlns:c="http://schemas.openxmlformats.org/drawingml/2006/chart" xmlns:r="http://schemas.openxmlformats.org/officeDocument/2006/relationships">
-  <c:lang val="en-US"/>
-  <c:chart>
-    <c:plotArea>
-      <c:layout/>
-      <c:barChart>
-        <c:barDir val="col"/>
-        <c:grouping val="clustered"/>
-        <c:ser>
-          <c:idx val="0"/>
-          <c:order val="0"/>
-          <c:tx>
-            <c:strRef>
-              <c:f>label 1</c:f>
-              <c:strCache>
-                <c:ptCount val="1"/>
-                <c:pt idx="0">
-                  <c:v>Mean</c:v>
-                </c:pt>
-              </c:strCache>
-            </c:strRef>
-          </c:tx>
-          <c:spPr>
-            <a:solidFill>
-              <a:srgbClr val="bd582c"/>
-            </a:solidFill>
-          </c:spPr>
-          <c:cat>
-            <c:strRef>
-              <c:f>categories</c:f>
-              <c:strCache>
-                <c:ptCount val="4"/>
-                <c:pt idx="0">
-                  <c:v>a</c:v>
-                </c:pt>
-                <c:pt idx="1">
-                  <c:v>b</c:v>
-                </c:pt>
-                <c:pt idx="2">
-                  <c:v>c</c:v>
-                </c:pt>
-                <c:pt idx="3">
-                  <c:v>d</c:v>
-                </c:pt>
-              </c:strCache>
-            </c:strRef>
-          </c:cat>
-          <c:val>
-            <c:numRef>
-              <c:f>0</c:f>
-              <c:numCache>
-                <c:formatCode>General</c:formatCode>
-                <c:ptCount val="4"/>
-                <c:pt idx="0">
-                  <c:v>0.338656725</c:v>
-                </c:pt>
-                <c:pt idx="1">
-                  <c:v>0.509358625</c:v>
-                </c:pt>
-                <c:pt idx="2">
-                  <c:v>0.3317222</c:v>
-                </c:pt>
-                <c:pt idx="3">
-                  <c:v>0.529088075</c:v>
-                </c:pt>
-              </c:numCache>
-            </c:numRef>
-          </c:val>
-        </c:ser>
-        <c:gapWidth val="219"/>
-        <c:axId val="33775734"/>
-        <c:axId val="49815575"/>
-      </c:barChart>
-      <c:catAx>
-        <c:axId val="33775734"/>
-        <c:scaling>
-          <c:orientation val="minMax"/>
-        </c:scaling>
-        <c:delete val="1"/>
-        <c:axPos val="b"/>
-        <c:majorTickMark val="out"/>
-        <c:minorTickMark val="none"/>
-        <c:tickLblPos val="nextTo"/>
-        <c:crossAx val="49815575"/>
-        <c:crossesAt val="0"/>
-        <c:lblAlgn val="ctr"/>
-        <c:auto val="1"/>
-        <c:lblOffset val="100"/>
-        <c:spPr>
-          <a:ln w="12600">
-            <a:solidFill>
-              <a:srgbClr val="8b8b8b"/>
-            </a:solidFill>
-            <a:round/>
-          </a:ln>
-        </c:spPr>
-      </c:catAx>
-      <c:valAx>
-        <c:axId val="49815575"/>
-        <c:scaling>
-          <c:orientation val="minMax"/>
-        </c:scaling>
-        <c:delete val="1"/>
-        <c:axPos val="l"/>
-        <c:majorTickMark val="out"/>
-        <c:minorTickMark val="none"/>
-        <c:tickLblPos val="nextTo"/>
-        <c:crossAx val="33775734"/>
-        <c:crossesAt val="0"/>
-        <c:spPr>
-          <a:ln w="12600">
-            <a:solidFill>
-              <a:srgbClr val="8b8b8b"/>
-            </a:solidFill>
-            <a:round/>
-          </a:ln>
-        </c:spPr>
-      </c:valAx>
-      <c:spPr/>
-    </c:plotArea>
-    <c:plotVisOnly val="1"/>
-  </c:chart>
-  <c:spPr>
-    <a:solidFill>
-      <a:srgbClr val="ffffff"/>
-    </a:solidFill>
-    <a:ln w="12600">
-      <a:solidFill>
-        <a:srgbClr val="000000"/>
-      </a:solidFill>
-      <a:round/>
-    </a:ln>
-  </c:spPr>
-</c:chartSpace>
-</file>
-
-<file path=ppt/charts/chart5.xml><?xml version="1.0" encoding="utf-8"?>
-<c:chartSpace xmlns:a="http://schemas.openxmlformats.org/drawingml/2006/main" xmlns:c="http://schemas.openxmlformats.org/drawingml/2006/chart" xmlns:r="http://schemas.openxmlformats.org/officeDocument/2006/relationships">
-  <c:lang val="en-US"/>
-  <c:chart>
-    <c:plotArea>
-      <c:layout/>
-      <c:barChart>
-        <c:barDir val="col"/>
-        <c:grouping val="clustered"/>
-        <c:ser>
-          <c:idx val="0"/>
-          <c:order val="0"/>
-          <c:tx>
-            <c:strRef>
-              <c:f>label 1</c:f>
-              <c:strCache>
-                <c:ptCount val="1"/>
-                <c:pt idx="0">
-                  <c:v>Mean</c:v>
-                </c:pt>
-              </c:strCache>
-            </c:strRef>
-          </c:tx>
-          <c:spPr>
-            <a:solidFill>
-              <a:srgbClr val="e48312"/>
-            </a:solidFill>
-          </c:spPr>
-          <c:cat>
-            <c:strRef>
-              <c:f>categories</c:f>
-              <c:strCache>
-                <c:ptCount val="4"/>
-                <c:pt idx="0">
-                  <c:v>a</c:v>
-                </c:pt>
-                <c:pt idx="1">
-                  <c:v>b</c:v>
-                </c:pt>
-                <c:pt idx="2">
-                  <c:v>c</c:v>
-                </c:pt>
-                <c:pt idx="3">
-                  <c:v>d</c:v>
-                </c:pt>
-              </c:strCache>
-            </c:strRef>
-          </c:cat>
-          <c:val>
-            <c:numRef>
-              <c:f>0</c:f>
-              <c:numCache>
-                <c:formatCode>General</c:formatCode>
-                <c:ptCount val="4"/>
-                <c:pt idx="0">
-                  <c:v>0.1179167</c:v>
-                </c:pt>
-                <c:pt idx="1">
-                  <c:v>0.105</c:v>
-                </c:pt>
-                <c:pt idx="2">
-                  <c:v>0.176805525</c:v>
-                </c:pt>
-                <c:pt idx="3">
-                  <c:v>0.188888875</c:v>
-                </c:pt>
-              </c:numCache>
-            </c:numRef>
-          </c:val>
-        </c:ser>
-        <c:gapWidth val="219"/>
-        <c:axId val="41534090"/>
-        <c:axId val="37015576"/>
-      </c:barChart>
-      <c:catAx>
-        <c:axId val="41534090"/>
-        <c:scaling>
-          <c:orientation val="minMax"/>
-        </c:scaling>
-        <c:delete val="1"/>
-        <c:axPos val="b"/>
-        <c:majorTickMark val="out"/>
-        <c:minorTickMark val="none"/>
-        <c:tickLblPos val="nextTo"/>
-        <c:crossAx val="37015576"/>
-        <c:crossesAt val="0"/>
-        <c:lblAlgn val="ctr"/>
-        <c:auto val="1"/>
-        <c:lblOffset val="100"/>
-        <c:spPr>
-          <a:ln w="12600">
-            <a:solidFill>
-              <a:srgbClr val="8b8b8b"/>
-            </a:solidFill>
-            <a:round/>
-          </a:ln>
-        </c:spPr>
-      </c:catAx>
-      <c:valAx>
-        <c:axId val="37015576"/>
-        <c:scaling>
-          <c:orientation val="minMax"/>
-        </c:scaling>
-        <c:delete val="1"/>
-        <c:axPos val="l"/>
-        <c:majorTickMark val="out"/>
-        <c:minorTickMark val="none"/>
-        <c:tickLblPos val="nextTo"/>
-        <c:crossAx val="41534090"/>
-        <c:crossesAt val="0"/>
-        <c:spPr>
-          <a:ln w="12600">
-            <a:solidFill>
-              <a:srgbClr val="8b8b8b"/>
-            </a:solidFill>
-            <a:round/>
-          </a:ln>
-        </c:spPr>
-      </c:valAx>
-      <c:spPr/>
-    </c:plotArea>
-    <c:plotVisOnly val="1"/>
-  </c:chart>
-  <c:spPr>
-    <a:solidFill>
-      <a:srgbClr val="ffffff"/>
-    </a:solidFill>
-    <a:ln w="12600">
-      <a:solidFill>
-        <a:srgbClr val="000000"/>
-      </a:solidFill>
-      <a:round/>
-    </a:ln>
-  </c:spPr>
-</c:chartSpace>
-</file>
-
-<file path=ppt/charts/chart6.xml><?xml version="1.0" encoding="utf-8"?>
-<c:chartSpace xmlns:a="http://schemas.openxmlformats.org/drawingml/2006/main" xmlns:c="http://schemas.openxmlformats.org/drawingml/2006/chart" xmlns:r="http://schemas.openxmlformats.org/officeDocument/2006/relationships">
-  <c:lang val="en-US"/>
-  <c:chart>
-    <c:plotArea>
-      <c:layout/>
-      <c:barChart>
-        <c:barDir val="col"/>
-        <c:grouping val="clustered"/>
-        <c:ser>
-          <c:idx val="0"/>
-          <c:order val="0"/>
-          <c:tx>
-            <c:strRef>
-              <c:f>label 1</c:f>
-              <c:strCache>
-                <c:ptCount val="1"/>
-                <c:pt idx="0">
-                  <c:v>Mean</c:v>
-                </c:pt>
-              </c:strCache>
-            </c:strRef>
-          </c:tx>
-          <c:spPr>
-            <a:solidFill>
-              <a:srgbClr val="bd582c"/>
-            </a:solidFill>
-          </c:spPr>
-          <c:cat>
-            <c:strRef>
-              <c:f>categories</c:f>
-              <c:strCache>
-                <c:ptCount val="4"/>
-                <c:pt idx="0">
-                  <c:v>a</c:v>
-                </c:pt>
-                <c:pt idx="1">
-                  <c:v>b</c:v>
-                </c:pt>
-                <c:pt idx="2">
-                  <c:v>c</c:v>
-                </c:pt>
-                <c:pt idx="3">
-                  <c:v>d</c:v>
-                </c:pt>
-              </c:strCache>
-            </c:strRef>
-          </c:cat>
-          <c:val>
-            <c:numRef>
-              <c:f>0</c:f>
-              <c:numCache>
-                <c:formatCode>General</c:formatCode>
-                <c:ptCount val="4"/>
-                <c:pt idx="0">
-                  <c:v>0.37653175</c:v>
-                </c:pt>
-                <c:pt idx="1">
-                  <c:v>0.32301285</c:v>
-                </c:pt>
-                <c:pt idx="2">
-                  <c:v>0.416117325</c:v>
-                </c:pt>
-                <c:pt idx="3">
-                  <c:v>0.38917525</c:v>
-                </c:pt>
-              </c:numCache>
-            </c:numRef>
-          </c:val>
-        </c:ser>
-        <c:gapWidth val="219"/>
-        <c:axId val="79986833"/>
-        <c:axId val="89015021"/>
-      </c:barChart>
-      <c:catAx>
-        <c:axId val="79986833"/>
-        <c:scaling>
-          <c:orientation val="minMax"/>
-        </c:scaling>
-        <c:delete val="1"/>
-        <c:axPos val="b"/>
-        <c:majorTickMark val="out"/>
-        <c:minorTickMark val="none"/>
-        <c:tickLblPos val="nextTo"/>
-        <c:crossAx val="89015021"/>
-        <c:crossesAt val="0"/>
-        <c:lblAlgn val="ctr"/>
-        <c:auto val="1"/>
-        <c:lblOffset val="100"/>
-        <c:spPr>
-          <a:ln w="12600">
-            <a:solidFill>
-              <a:srgbClr val="8b8b8b"/>
-            </a:solidFill>
-            <a:round/>
-          </a:ln>
-        </c:spPr>
-      </c:catAx>
-      <c:valAx>
-        <c:axId val="89015021"/>
-        <c:scaling>
-          <c:orientation val="minMax"/>
-        </c:scaling>
-        <c:delete val="1"/>
-        <c:axPos val="l"/>
-        <c:majorTickMark val="out"/>
-        <c:minorTickMark val="none"/>
-        <c:tickLblPos val="nextTo"/>
-        <c:crossAx val="79986833"/>
-        <c:crossesAt val="0"/>
-        <c:spPr>
-          <a:ln w="12600">
-            <a:solidFill>
-              <a:srgbClr val="8b8b8b"/>
-            </a:solidFill>
-            <a:round/>
-          </a:ln>
-        </c:spPr>
-      </c:valAx>
-      <c:spPr/>
-    </c:plotArea>
-    <c:plotVisOnly val="1"/>
-  </c:chart>
-  <c:spPr>
-    <a:solidFill>
-      <a:srgbClr val="ffffff"/>
-    </a:solidFill>
-    <a:ln w="12600">
-      <a:solidFill>
-        <a:srgbClr val="000000"/>
-      </a:solidFill>
-      <a:round/>
-    </a:ln>
-  </c:spPr>
-</c:chartSpace>
-</file>
-
-<file path=ppt/charts/chart7.xml><?xml version="1.0" encoding="utf-8"?>
-<c:chartSpace xmlns:a="http://schemas.openxmlformats.org/drawingml/2006/main" xmlns:c="http://schemas.openxmlformats.org/drawingml/2006/chart" xmlns:r="http://schemas.openxmlformats.org/officeDocument/2006/relationships">
-  <c:lang val="en-US"/>
-  <c:chart>
-    <c:plotArea>
-      <c:layout/>
-      <c:barChart>
-        <c:barDir val="col"/>
-        <c:grouping val="clustered"/>
-        <c:ser>
-          <c:idx val="0"/>
-          <c:order val="0"/>
-          <c:tx>
-            <c:strRef>
-              <c:f>label 1</c:f>
-              <c:strCache>
-                <c:ptCount val="1"/>
-                <c:pt idx="0">
-                  <c:v>Mean</c:v>
-                </c:pt>
-              </c:strCache>
-            </c:strRef>
-          </c:tx>
-          <c:spPr>
-            <a:solidFill>
-              <a:srgbClr val="e48312"/>
-            </a:solidFill>
-          </c:spPr>
-          <c:cat>
-            <c:strRef>
-              <c:f>categories</c:f>
-              <c:strCache>
-                <c:ptCount val="4"/>
-                <c:pt idx="0">
-                  <c:v>a</c:v>
-                </c:pt>
-                <c:pt idx="1">
-                  <c:v>b</c:v>
-                </c:pt>
-                <c:pt idx="2">
-                  <c:v>c</c:v>
-                </c:pt>
-                <c:pt idx="3">
-                  <c:v>d</c:v>
-                </c:pt>
-              </c:strCache>
-            </c:strRef>
-          </c:cat>
-          <c:val>
-            <c:numRef>
-              <c:f>0</c:f>
-              <c:numCache>
-                <c:formatCode>General</c:formatCode>
-                <c:ptCount val="4"/>
-                <c:pt idx="0">
-                  <c:v>0.20750005</c:v>
-                </c:pt>
-                <c:pt idx="1">
-                  <c:v>0.2126389</c:v>
-                </c:pt>
-                <c:pt idx="2">
-                  <c:v>0.1825</c:v>
-                </c:pt>
-                <c:pt idx="3">
-                  <c:v>0.19652785</c:v>
-                </c:pt>
-              </c:numCache>
-            </c:numRef>
-          </c:val>
-        </c:ser>
-        <c:gapWidth val="219"/>
-        <c:axId val="29214418"/>
-        <c:axId val="69396764"/>
-      </c:barChart>
-      <c:catAx>
-        <c:axId val="29214418"/>
-        <c:scaling>
-          <c:orientation val="minMax"/>
-        </c:scaling>
-        <c:delete val="1"/>
-        <c:axPos val="b"/>
-        <c:majorTickMark val="out"/>
-        <c:minorTickMark val="none"/>
-        <c:tickLblPos val="nextTo"/>
-        <c:crossAx val="69396764"/>
-        <c:crossesAt val="0"/>
-        <c:lblAlgn val="ctr"/>
-        <c:auto val="1"/>
-        <c:lblOffset val="100"/>
-        <c:spPr>
-          <a:ln w="12600">
-            <a:solidFill>
-              <a:srgbClr val="8b8b8b"/>
-            </a:solidFill>
-            <a:round/>
-          </a:ln>
-        </c:spPr>
-      </c:catAx>
-      <c:valAx>
-        <c:axId val="69396764"/>
-        <c:scaling>
-          <c:orientation val="minMax"/>
-        </c:scaling>
-        <c:delete val="1"/>
-        <c:axPos val="l"/>
-        <c:majorTickMark val="out"/>
-        <c:minorTickMark val="none"/>
-        <c:tickLblPos val="nextTo"/>
-        <c:crossAx val="29214418"/>
-        <c:crossesAt val="0"/>
-        <c:spPr>
-          <a:ln w="12600">
-            <a:solidFill>
-              <a:srgbClr val="8b8b8b"/>
-            </a:solidFill>
-            <a:round/>
-          </a:ln>
-        </c:spPr>
-      </c:valAx>
-      <c:spPr/>
-    </c:plotArea>
-    <c:plotVisOnly val="1"/>
-  </c:chart>
-  <c:spPr>
-    <a:solidFill>
-      <a:srgbClr val="ffffff"/>
-    </a:solidFill>
-    <a:ln w="12600">
-      <a:solidFill>
-        <a:srgbClr val="000000"/>
-      </a:solidFill>
-      <a:round/>
-    </a:ln>
-  </c:spPr>
-</c:chartSpace>
-</file>
-
-<file path=ppt/charts/chart8.xml><?xml version="1.0" encoding="utf-8"?>
-<c:chartSpace xmlns:a="http://schemas.openxmlformats.org/drawingml/2006/main" xmlns:c="http://schemas.openxmlformats.org/drawingml/2006/chart" xmlns:r="http://schemas.openxmlformats.org/officeDocument/2006/relationships">
-  <c:lang val="en-US"/>
-  <c:chart>
-    <c:plotArea>
-      <c:layout/>
-      <c:barChart>
-        <c:barDir val="col"/>
-        <c:grouping val="clustered"/>
-        <c:ser>
-          <c:idx val="0"/>
-          <c:order val="0"/>
-          <c:tx>
-            <c:strRef>
-              <c:f>label 1</c:f>
-              <c:strCache>
-                <c:ptCount val="1"/>
-                <c:pt idx="0">
-                  <c:v>Mean</c:v>
-                </c:pt>
-              </c:strCache>
-            </c:strRef>
-          </c:tx>
-          <c:spPr>
-            <a:solidFill>
-              <a:srgbClr val="bd582c"/>
-            </a:solidFill>
-          </c:spPr>
-          <c:cat>
-            <c:strRef>
-              <c:f>categories</c:f>
-              <c:strCache>
-                <c:ptCount val="4"/>
-                <c:pt idx="0">
-                  <c:v>a</c:v>
-                </c:pt>
-                <c:pt idx="1">
-                  <c:v>b</c:v>
-                </c:pt>
-                <c:pt idx="2">
-                  <c:v>c</c:v>
-                </c:pt>
-                <c:pt idx="3">
-                  <c:v>d</c:v>
-                </c:pt>
-              </c:strCache>
-            </c:strRef>
-          </c:cat>
-          <c:val>
-            <c:numRef>
-              <c:f>0</c:f>
-              <c:numCache>
-                <c:formatCode>General</c:formatCode>
-                <c:ptCount val="4"/>
-                <c:pt idx="0">
-                  <c:v>0.545148625</c:v>
-                </c:pt>
-                <c:pt idx="1">
-                  <c:v>0.550356925</c:v>
-                </c:pt>
-                <c:pt idx="2">
-                  <c:v>0.61857965</c:v>
-                </c:pt>
-                <c:pt idx="3">
-                  <c:v>0.623414575</c:v>
-                </c:pt>
-              </c:numCache>
-            </c:numRef>
-          </c:val>
-        </c:ser>
-        <c:gapWidth val="219"/>
-        <c:axId val="77009277"/>
-        <c:axId val="49710071"/>
-      </c:barChart>
-      <c:catAx>
-        <c:axId val="77009277"/>
-        <c:scaling>
-          <c:orientation val="minMax"/>
-        </c:scaling>
-        <c:delete val="1"/>
-        <c:axPos val="b"/>
-        <c:majorTickMark val="out"/>
-        <c:minorTickMark val="none"/>
-        <c:tickLblPos val="nextTo"/>
-        <c:crossAx val="49710071"/>
-        <c:crossesAt val="0"/>
-        <c:lblAlgn val="ctr"/>
-        <c:auto val="1"/>
-        <c:lblOffset val="100"/>
-        <c:spPr>
-          <a:ln w="12600">
-            <a:solidFill>
-              <a:srgbClr val="8b8b8b"/>
-            </a:solidFill>
-            <a:round/>
-          </a:ln>
-        </c:spPr>
-      </c:catAx>
-      <c:valAx>
-        <c:axId val="49710071"/>
-        <c:scaling>
-          <c:orientation val="minMax"/>
-        </c:scaling>
-        <c:delete val="1"/>
-        <c:axPos val="l"/>
-        <c:majorTickMark val="out"/>
-        <c:minorTickMark val="none"/>
-        <c:tickLblPos val="nextTo"/>
-        <c:crossAx val="77009277"/>
-        <c:crossesAt val="0"/>
-        <c:spPr>
-          <a:ln w="12600">
-            <a:solidFill>
-              <a:srgbClr val="8b8b8b"/>
-            </a:solidFill>
-            <a:round/>
-          </a:ln>
-        </c:spPr>
-      </c:valAx>
-      <c:spPr>
-        <a:solidFill>
-          <a:srgbClr val="ffffff"/>
-        </a:solidFill>
-      </c:spPr>
-    </c:plotArea>
-    <c:plotVisOnly val="1"/>
-  </c:chart>
-  <c:spPr>
-    <a:solidFill>
-      <a:srgbClr val="ffffff"/>
-    </a:solidFill>
-    <a:ln w="12600">
-      <a:solidFill>
-        <a:srgbClr val="000000"/>
-      </a:solidFill>
-      <a:round/>
-    </a:ln>
-  </c:spPr>
-</c:chartSpace>
 </file>
 
 <file path=ppt/notesMasters/notesMaster1.xml><?xml version="1.0" encoding="utf-8"?>
@@ -1316,7 +193,7 @@
           <a:bodyPr anchor="b" bIns="0" lIns="0" rIns="0" tIns="0" wrap="none"/>
           <a:p>
             <a:pPr algn="r"/>
-            <a:fld id="{91412111-4131-4131-A1A1-D13181A1A111}" type="slidenum">
+            <a:fld id="{41E1A121-F1B1-4171-B161-51D181416151}" type="slidenum">
               <a:rPr lang="en-US"/>
               <a:t>&lt;number&gt;</a:t>
             </a:fld>
@@ -1349,7 +226,7 @@
       </p:grpSpPr>
       <p:sp>
         <p:nvSpPr>
-          <p:cNvPr id="222" name="PlaceHolder 1"/>
+          <p:cNvPr id="230" name="PlaceHolder 1"/>
           <p:cNvSpPr>
             <a:spLocks noGrp="1"/>
           </p:cNvSpPr>
@@ -1375,7 +252,7 @@
       </p:sp>
       <p:sp>
         <p:nvSpPr>
-          <p:cNvPr id="223" name="TextShape 2"/>
+          <p:cNvPr id="231" name="TextShape 2"/>
           <p:cNvSpPr txBox="1"/>
           <p:nvPr/>
         </p:nvSpPr>
@@ -1396,7 +273,7 @@
                 <a:spcPct val="100000"/>
               </a:lnSpc>
             </a:pPr>
-            <a:fld id="{819171C1-F1B1-4141-A181-A13151613111}" type="slidenum">
+            <a:fld id="{91A1C111-C1F1-41B1-B1A1-F13121B1B121}" type="slidenum">
               <a:rPr lang="en-US">
                 <a:solidFill>
                   <a:srgbClr val="000000"/>
@@ -1434,7 +311,7 @@
       </p:grpSpPr>
       <p:sp>
         <p:nvSpPr>
-          <p:cNvPr id="238" name="PlaceHolder 1"/>
+          <p:cNvPr id="246" name="PlaceHolder 1"/>
           <p:cNvSpPr>
             <a:spLocks noGrp="1"/>
           </p:cNvSpPr>
@@ -1464,7 +341,7 @@
       </p:sp>
       <p:sp>
         <p:nvSpPr>
-          <p:cNvPr id="239" name="TextShape 2"/>
+          <p:cNvPr id="247" name="TextShape 2"/>
           <p:cNvSpPr txBox="1"/>
           <p:nvPr/>
         </p:nvSpPr>
@@ -1485,7 +362,7 @@
                 <a:spcPct val="100000"/>
               </a:lnSpc>
             </a:pPr>
-            <a:fld id="{412151E1-4111-4121-B1E1-4171D1B13111}" type="slidenum">
+            <a:fld id="{815131D1-0131-4101-A141-B1A1B13111C1}" type="slidenum">
               <a:rPr lang="en-US">
                 <a:solidFill>
                   <a:srgbClr val="000000"/>
@@ -1523,7 +400,7 @@
       </p:grpSpPr>
       <p:sp>
         <p:nvSpPr>
-          <p:cNvPr id="240" name="PlaceHolder 1"/>
+          <p:cNvPr id="248" name="PlaceHolder 1"/>
           <p:cNvSpPr>
             <a:spLocks noGrp="1"/>
           </p:cNvSpPr>
@@ -1553,7 +430,7 @@
       </p:sp>
       <p:sp>
         <p:nvSpPr>
-          <p:cNvPr id="241" name="TextShape 2"/>
+          <p:cNvPr id="249" name="TextShape 2"/>
           <p:cNvSpPr txBox="1"/>
           <p:nvPr/>
         </p:nvSpPr>
@@ -1574,7 +451,7 @@
                 <a:spcPct val="100000"/>
               </a:lnSpc>
             </a:pPr>
-            <a:fld id="{B1813111-6121-4131-B181-01D1E121C1B1}" type="slidenum">
+            <a:fld id="{71116181-E141-4101-9181-718171310181}" type="slidenum">
               <a:rPr lang="en-US">
                 <a:solidFill>
                   <a:srgbClr val="000000"/>
@@ -1612,7 +489,7 @@
       </p:grpSpPr>
       <p:sp>
         <p:nvSpPr>
-          <p:cNvPr id="242" name="PlaceHolder 1"/>
+          <p:cNvPr id="250" name="PlaceHolder 1"/>
           <p:cNvSpPr>
             <a:spLocks noGrp="1"/>
           </p:cNvSpPr>
@@ -1642,7 +519,7 @@
       </p:sp>
       <p:sp>
         <p:nvSpPr>
-          <p:cNvPr id="243" name="TextShape 2"/>
+          <p:cNvPr id="251" name="TextShape 2"/>
           <p:cNvSpPr txBox="1"/>
           <p:nvPr/>
         </p:nvSpPr>
@@ -1663,7 +540,7 @@
                 <a:spcPct val="100000"/>
               </a:lnSpc>
             </a:pPr>
-            <a:fld id="{412171D1-61A1-41C1-B1A1-C1F1E1B19101}" type="slidenum">
+            <a:fld id="{D16171C1-B101-4131-B1B1-41014101C171}" type="slidenum">
               <a:rPr lang="en-US">
                 <a:solidFill>
                   <a:srgbClr val="000000"/>
@@ -1701,7 +578,7 @@
       </p:grpSpPr>
       <p:sp>
         <p:nvSpPr>
-          <p:cNvPr id="244" name="PlaceHolder 1"/>
+          <p:cNvPr id="252" name="PlaceHolder 1"/>
           <p:cNvSpPr>
             <a:spLocks noGrp="1"/>
           </p:cNvSpPr>
@@ -1731,7 +608,7 @@
       </p:sp>
       <p:sp>
         <p:nvSpPr>
-          <p:cNvPr id="245" name="TextShape 2"/>
+          <p:cNvPr id="253" name="TextShape 2"/>
           <p:cNvSpPr txBox="1"/>
           <p:nvPr/>
         </p:nvSpPr>
@@ -1752,7 +629,7 @@
                 <a:spcPct val="100000"/>
               </a:lnSpc>
             </a:pPr>
-            <a:fld id="{817121B1-6121-4161-9161-A1B1D1F10111}" type="slidenum">
+            <a:fld id="{11210131-2191-4121-91A1-F171D1B1D1C1}" type="slidenum">
               <a:rPr lang="en-US">
                 <a:solidFill>
                   <a:srgbClr val="000000"/>
@@ -1790,7 +667,7 @@
       </p:grpSpPr>
       <p:sp>
         <p:nvSpPr>
-          <p:cNvPr id="246" name="PlaceHolder 1"/>
+          <p:cNvPr id="254" name="PlaceHolder 1"/>
           <p:cNvSpPr>
             <a:spLocks noGrp="1"/>
           </p:cNvSpPr>
@@ -1820,7 +697,7 @@
       </p:sp>
       <p:sp>
         <p:nvSpPr>
-          <p:cNvPr id="247" name="TextShape 2"/>
+          <p:cNvPr id="255" name="TextShape 2"/>
           <p:cNvSpPr txBox="1"/>
           <p:nvPr/>
         </p:nvSpPr>
@@ -1841,7 +718,7 @@
                 <a:spcPct val="100000"/>
               </a:lnSpc>
             </a:pPr>
-            <a:fld id="{513141F1-91A1-41D1-B1D1-F1B1C1C1C1A1}" type="slidenum">
+            <a:fld id="{D1B1C171-41D1-41A1-B111-C1619181C1F1}" type="slidenum">
               <a:rPr lang="en-US">
                 <a:solidFill>
                   <a:srgbClr val="000000"/>
@@ -1879,7 +756,7 @@
       </p:grpSpPr>
       <p:sp>
         <p:nvSpPr>
-          <p:cNvPr id="248" name="PlaceHolder 1"/>
+          <p:cNvPr id="256" name="PlaceHolder 1"/>
           <p:cNvSpPr>
             <a:spLocks noGrp="1"/>
           </p:cNvSpPr>
@@ -1909,7 +786,7 @@
       </p:sp>
       <p:sp>
         <p:nvSpPr>
-          <p:cNvPr id="249" name="TextShape 2"/>
+          <p:cNvPr id="257" name="TextShape 2"/>
           <p:cNvSpPr txBox="1"/>
           <p:nvPr/>
         </p:nvSpPr>
@@ -1930,7 +807,96 @@
                 <a:spcPct val="100000"/>
               </a:lnSpc>
             </a:pPr>
-            <a:fld id="{815171D1-B1C1-41A1-9141-E161E1E171E1}" type="slidenum">
+            <a:fld id="{51114101-F131-4121-A171-7111F1D1B1C1}" type="slidenum">
+              <a:rPr lang="en-US">
+                <a:solidFill>
+                  <a:srgbClr val="000000"/>
+                </a:solidFill>
+                <a:latin typeface="+mn-lt"/>
+                <a:ea typeface="+mn-ea"/>
+              </a:rPr>
+              <a:t>&lt;number&gt;</a:t>
+            </a:fld>
+            <a:endParaRPr/>
+          </a:p>
+        </p:txBody>
+      </p:sp>
+    </p:spTree>
+  </p:cSld>
+</p:notes>
+</file>
+
+<file path=ppt/notesSlides/notesSlide16.xml><?xml version="1.0" encoding="utf-8"?>
+<p:notes xmlns:a="http://schemas.openxmlformats.org/drawingml/2006/main" xmlns:p="http://schemas.openxmlformats.org/presentationml/2006/main" xmlns:r="http://schemas.openxmlformats.org/officeDocument/2006/relationships">
+  <p:cSld>
+    <p:spTree>
+      <p:nvGrpSpPr>
+        <p:cNvPr id="1" name=""/>
+        <p:cNvGrpSpPr/>
+        <p:nvPr/>
+      </p:nvGrpSpPr>
+      <p:grpSpPr>
+        <a:xfrm>
+          <a:off x="0" y="0"/>
+          <a:ext cx="0" cy="0"/>
+          <a:chOff x="0" y="0"/>
+          <a:chExt cx="0" cy="0"/>
+        </a:xfrm>
+      </p:grpSpPr>
+      <p:sp>
+        <p:nvSpPr>
+          <p:cNvPr id="258" name="PlaceHolder 1"/>
+          <p:cNvSpPr>
+            <a:spLocks noGrp="1"/>
+          </p:cNvSpPr>
+          <p:nvPr>
+            <p:ph type="body"/>
+          </p:nvPr>
+        </p:nvSpPr>
+        <p:spPr>
+          <a:xfrm>
+            <a:off x="0" y="0"/>
+            <a:ext cx="-11796840" cy="-11796840"/>
+          </a:xfrm>
+          <a:prstGeom prst="rect">
+            <a:avLst/>
+          </a:prstGeom>
+        </p:spPr>
+        <p:txBody>
+          <a:bodyPr bIns="45000" lIns="90000" rIns="90000" tIns="45000"/>
+          <a:p>
+            <a:r>
+              <a:rPr lang="en-US"/>
+              <a:t>Cheese is good</a:t>
+            </a:r>
+            <a:endParaRPr/>
+          </a:p>
+        </p:txBody>
+      </p:sp>
+      <p:sp>
+        <p:nvSpPr>
+          <p:cNvPr id="259" name="TextShape 2"/>
+          <p:cNvSpPr txBox="1"/>
+          <p:nvPr/>
+        </p:nvSpPr>
+        <p:spPr>
+          <a:xfrm>
+            <a:off x="0" y="0"/>
+            <a:ext cx="-11796840" cy="-11796840"/>
+          </a:xfrm>
+          <a:prstGeom prst="rect">
+            <a:avLst/>
+          </a:prstGeom>
+        </p:spPr>
+        <p:txBody>
+          <a:bodyPr bIns="45000" lIns="90000" rIns="90000" tIns="45000"/>
+          <a:p>
+            <a:pPr>
+              <a:lnSpc>
+                <a:spcPct val="100000"/>
+              </a:lnSpc>
+            </a:pPr>
+            <a:fld id="{B101E111-B1A1-41A1-B1D1-81F191E11121}" type="slidenum">
               <a:rPr lang="en-US">
                 <a:solidFill>
                   <a:srgbClr val="000000"/>
@@ -1968,7 +934,7 @@
       </p:grpSpPr>
       <p:sp>
         <p:nvSpPr>
-          <p:cNvPr id="224" name="PlaceHolder 1"/>
+          <p:cNvPr id="232" name="PlaceHolder 1"/>
           <p:cNvSpPr>
             <a:spLocks noGrp="1"/>
           </p:cNvSpPr>
@@ -1998,7 +964,7 @@
       </p:sp>
       <p:sp>
         <p:nvSpPr>
-          <p:cNvPr id="225" name="TextShape 2"/>
+          <p:cNvPr id="233" name="TextShape 2"/>
           <p:cNvSpPr txBox="1"/>
           <p:nvPr/>
         </p:nvSpPr>
@@ -2019,7 +985,7 @@
                 <a:spcPct val="100000"/>
               </a:lnSpc>
             </a:pPr>
-            <a:fld id="{11814111-B131-41E1-A171-010191F1A1A1}" type="slidenum">
+            <a:fld id="{71F16111-A161-4111-8161-C1C141A1A1C1}" type="slidenum">
               <a:rPr lang="en-US">
                 <a:solidFill>
                   <a:srgbClr val="000000"/>
@@ -2057,7 +1023,7 @@
       </p:grpSpPr>
       <p:sp>
         <p:nvSpPr>
-          <p:cNvPr id="226" name="PlaceHolder 1"/>
+          <p:cNvPr id="234" name="PlaceHolder 1"/>
           <p:cNvSpPr>
             <a:spLocks noGrp="1"/>
           </p:cNvSpPr>
@@ -2087,7 +1053,7 @@
       </p:sp>
       <p:sp>
         <p:nvSpPr>
-          <p:cNvPr id="227" name="TextShape 2"/>
+          <p:cNvPr id="235" name="TextShape 2"/>
           <p:cNvSpPr txBox="1"/>
           <p:nvPr/>
         </p:nvSpPr>
@@ -2108,7 +1074,7 @@
                 <a:spcPct val="100000"/>
               </a:lnSpc>
             </a:pPr>
-            <a:fld id="{A151D1B1-51E1-4121-B161-E1818111C161}" type="slidenum">
+            <a:fld id="{01615121-3121-4191-A1E1-B171B121F1C1}" type="slidenum">
               <a:rPr lang="en-US">
                 <a:solidFill>
                   <a:srgbClr val="000000"/>
@@ -2146,7 +1112,7 @@
       </p:grpSpPr>
       <p:sp>
         <p:nvSpPr>
-          <p:cNvPr id="228" name="PlaceHolder 1"/>
+          <p:cNvPr id="236" name="PlaceHolder 1"/>
           <p:cNvSpPr>
             <a:spLocks noGrp="1"/>
           </p:cNvSpPr>
@@ -2176,7 +1142,7 @@
       </p:sp>
       <p:sp>
         <p:nvSpPr>
-          <p:cNvPr id="229" name="TextShape 2"/>
+          <p:cNvPr id="237" name="TextShape 2"/>
           <p:cNvSpPr txBox="1"/>
           <p:nvPr/>
         </p:nvSpPr>
@@ -2197,7 +1163,7 @@
                 <a:spcPct val="100000"/>
               </a:lnSpc>
             </a:pPr>
-            <a:fld id="{618141D1-C191-4181-B1D1-21018181F1E1}" type="slidenum">
+            <a:fld id="{01E121B1-0081-41A1-9181-E1E141E1C1E1}" type="slidenum">
               <a:rPr lang="en-US">
                 <a:solidFill>
                   <a:srgbClr val="000000"/>
@@ -2235,7 +1201,7 @@
       </p:grpSpPr>
       <p:sp>
         <p:nvSpPr>
-          <p:cNvPr id="230" name="PlaceHolder 1"/>
+          <p:cNvPr id="238" name="PlaceHolder 1"/>
           <p:cNvSpPr>
             <a:spLocks noGrp="1"/>
           </p:cNvSpPr>
@@ -2265,7 +1231,7 @@
       </p:sp>
       <p:sp>
         <p:nvSpPr>
-          <p:cNvPr id="231" name="TextShape 2"/>
+          <p:cNvPr id="239" name="TextShape 2"/>
           <p:cNvSpPr txBox="1"/>
           <p:nvPr/>
         </p:nvSpPr>
@@ -2286,7 +1252,7 @@
                 <a:spcPct val="100000"/>
               </a:lnSpc>
             </a:pPr>
-            <a:fld id="{61A101C1-21B1-4161-A111-F1D111B12191}" type="slidenum">
+            <a:fld id="{414181E1-D111-41C1-A171-31E16111B141}" type="slidenum">
               <a:rPr lang="en-US">
                 <a:solidFill>
                   <a:srgbClr val="000000"/>
@@ -2324,7 +1290,7 @@
       </p:grpSpPr>
       <p:sp>
         <p:nvSpPr>
-          <p:cNvPr id="232" name="PlaceHolder 1"/>
+          <p:cNvPr id="240" name="PlaceHolder 1"/>
           <p:cNvSpPr>
             <a:spLocks noGrp="1"/>
           </p:cNvSpPr>
@@ -2354,7 +1320,7 @@
       </p:sp>
       <p:sp>
         <p:nvSpPr>
-          <p:cNvPr id="233" name="TextShape 2"/>
+          <p:cNvPr id="241" name="TextShape 2"/>
           <p:cNvSpPr txBox="1"/>
           <p:nvPr/>
         </p:nvSpPr>
@@ -2375,7 +1341,7 @@
                 <a:spcPct val="100000"/>
               </a:lnSpc>
             </a:pPr>
-            <a:fld id="{3131A111-F1E1-41B1-8171-81F171011101}" type="slidenum">
+            <a:fld id="{E14131E1-71B1-4111-B141-51F1C121A131}" type="slidenum">
               <a:rPr lang="en-US">
                 <a:solidFill>
                   <a:srgbClr val="000000"/>
@@ -2413,7 +1379,7 @@
       </p:grpSpPr>
       <p:sp>
         <p:nvSpPr>
-          <p:cNvPr id="234" name="PlaceHolder 1"/>
+          <p:cNvPr id="242" name="PlaceHolder 1"/>
           <p:cNvSpPr>
             <a:spLocks noGrp="1"/>
           </p:cNvSpPr>
@@ -2443,7 +1409,7 @@
       </p:sp>
       <p:sp>
         <p:nvSpPr>
-          <p:cNvPr id="235" name="TextShape 2"/>
+          <p:cNvPr id="243" name="TextShape 2"/>
           <p:cNvSpPr txBox="1"/>
           <p:nvPr/>
         </p:nvSpPr>
@@ -2464,7 +1430,7 @@
                 <a:spcPct val="100000"/>
               </a:lnSpc>
             </a:pPr>
-            <a:fld id="{91212121-7111-41D1-A181-21A1B1D1F171}" type="slidenum">
+            <a:fld id="{21D15151-3181-41F1-91C1-31C1F191C191}" type="slidenum">
               <a:rPr lang="en-US">
                 <a:solidFill>
                   <a:srgbClr val="000000"/>
@@ -2502,7 +1468,7 @@
       </p:grpSpPr>
       <p:sp>
         <p:nvSpPr>
-          <p:cNvPr id="236" name="PlaceHolder 1"/>
+          <p:cNvPr id="244" name="PlaceHolder 1"/>
           <p:cNvSpPr>
             <a:spLocks noGrp="1"/>
           </p:cNvSpPr>
@@ -2532,7 +1498,7 @@
       </p:sp>
       <p:sp>
         <p:nvSpPr>
-          <p:cNvPr id="237" name="TextShape 2"/>
+          <p:cNvPr id="245" name="TextShape 2"/>
           <p:cNvSpPr txBox="1"/>
           <p:nvPr/>
         </p:nvSpPr>
@@ -2553,7 +1519,7 @@
                 <a:spcPct val="100000"/>
               </a:lnSpc>
             </a:pPr>
-            <a:fld id="{81C1C1F1-E161-4161-B151-31919151F1E1}" type="slidenum">
+            <a:fld id="{21B191E1-11F1-41B1-9101-A101F15111E1}" type="slidenum">
               <a:rPr lang="en-US">
                 <a:solidFill>
                   <a:srgbClr val="000000"/>
@@ -6135,7 +5101,7 @@
                 <a:spcPct val="100000"/>
               </a:lnSpc>
             </a:pPr>
-            <a:fld id="{11D171A1-D181-4111-A161-A1A161815111}" type="slidenum">
+            <a:fld id="{71818131-8131-4111-9191-61311131F151}" type="slidenum">
               <a:rPr lang="en-US">
                 <a:solidFill>
                   <a:srgbClr val="000000"/>
@@ -6739,7 +5705,7 @@
                 <a:spcPct val="100000"/>
               </a:lnSpc>
             </a:pPr>
-            <a:fld id="{21516151-4151-4131-A1B1-8181F18131C1}" type="slidenum">
+            <a:fld id="{F1114121-D121-4131-B171-11C181310191}" type="slidenum">
               <a:rPr lang="en-US">
                 <a:solidFill>
                   <a:srgbClr val="000000"/>
@@ -6806,7 +5772,7 @@
                   <a:srgbClr val="ffffff"/>
                 </a:solidFill>
               </a:rPr>
-              <a:t>15</a:t>
+              <a:t>16</a:t>
             </a:r>
             <a:endParaRPr/>
           </a:p>
@@ -7769,7 +6735,7 @@
                 <a:spcPct val="100000"/>
               </a:lnSpc>
             </a:pPr>
-            <a:fld id="{31712191-2151-4141-8171-E151B1A1D1A1}" type="slidenum">
+            <a:fld id="{51A15101-81A1-41B1-8111-7181E1B18161}" type="slidenum">
               <a:rPr lang="en-US">
                 <a:solidFill>
                   <a:srgbClr val="000000"/>
@@ -7836,7 +6802,7 @@
                   <a:srgbClr val="ffffff"/>
                 </a:solidFill>
               </a:rPr>
-              <a:t>15</a:t>
+              <a:t>16</a:t>
             </a:r>
             <a:endParaRPr/>
           </a:p>
@@ -7969,6 +6935,35 @@
       </p:sp>
     </p:spTree>
   </p:cSld>
+  <p:timing>
+    <p:tnLst>
+      <p:par>
+        <p:cTn dur="indefinite" id="1" nodeType="tmRoot" restart="never">
+          <p:childTnLst>
+            <p:seq>
+              <p:cTn id="2" nodeType="mainSeq">
+                <p:childTnLst/>
+              </p:cTn>
+              <p:prevCondLst>
+                <p:cond delay="0" evt="onPrev">
+                  <p:tgtEl>
+                    <p:sldTgt/>
+                  </p:tgtEl>
+                </p:cond>
+              </p:prevCondLst>
+              <p:nextCondLst>
+                <p:cond delay="0" evt="onNext">
+                  <p:tgtEl>
+                    <p:sldTgt/>
+                  </p:tgtEl>
+                </p:cond>
+              </p:nextCondLst>
+            </p:seq>
+          </p:childTnLst>
+        </p:cTn>
+      </p:par>
+    </p:tnLst>
+  </p:timing>
 </p:sld>
 </file>
 
@@ -8051,15 +7046,15 @@
         </p:nvSpPr>
         <p:spPr>
           <a:xfrm>
-            <a:off x="1097280" y="1846080"/>
-            <a:ext cx="4937400" cy="735840"/>
-          </a:xfrm>
-          <a:prstGeom prst="rect">
-            <a:avLst/>
-          </a:prstGeom>
-        </p:spPr>
-        <p:txBody>
-          <a:bodyPr anchor="ctr"/>
+            <a:off x="0" y="0"/>
+            <a:ext cx="-11796840" cy="-11796840"/>
+          </a:xfrm>
+          <a:prstGeom prst="rect">
+            <a:avLst/>
+          </a:prstGeom>
+        </p:spPr>
+        <p:txBody>
+          <a:bodyPr bIns="45000" lIns="90000" rIns="90000" tIns="45000"/>
           <a:p>
             <a:pPr>
               <a:lnSpc>
@@ -8067,13 +7062,13 @@
               </a:lnSpc>
             </a:pPr>
             <a:r>
-              <a:rPr lang="en-US" sz="2000">
-                <a:solidFill>
-                  <a:srgbClr val="637052"/>
-                </a:solidFill>
-                <a:latin typeface="Calibri"/>
-              </a:rPr>
-              <a:t>Metric 1</a:t>
+              <a:rPr lang="en-US">
+                <a:solidFill>
+                  <a:srgbClr val="000000"/>
+                </a:solidFill>
+                <a:latin typeface="Calibri"/>
+              </a:rPr>
+              <a:t>15/12/2015</a:t>
             </a:r>
             <a:endParaRPr/>
           </a:p>
@@ -8087,29 +7082,29 @@
         </p:nvSpPr>
         <p:spPr>
           <a:xfrm>
-            <a:off x="6217920" y="1846080"/>
-            <a:ext cx="4937400" cy="735840"/>
-          </a:xfrm>
-          <a:prstGeom prst="rect">
-            <a:avLst/>
-          </a:prstGeom>
-        </p:spPr>
-        <p:txBody>
-          <a:bodyPr anchor="ctr"/>
-          <a:p>
-            <a:pPr algn="ctr">
+            <a:off x="0" y="0"/>
+            <a:ext cx="-11796840" cy="-11796840"/>
+          </a:xfrm>
+          <a:prstGeom prst="rect">
+            <a:avLst/>
+          </a:prstGeom>
+        </p:spPr>
+        <p:txBody>
+          <a:bodyPr bIns="45000" lIns="90000" rIns="90000" tIns="45000"/>
+          <a:p>
+            <a:pPr>
               <a:lnSpc>
                 <a:spcPct val="100000"/>
               </a:lnSpc>
             </a:pPr>
             <a:r>
-              <a:rPr lang="en-US" sz="2000">
-                <a:solidFill>
-                  <a:srgbClr val="637052"/>
-                </a:solidFill>
-                <a:latin typeface="Calibri"/>
-              </a:rPr>
-              <a:t>Metric 2</a:t>
+              <a:rPr lang="en-US">
+                <a:solidFill>
+                  <a:srgbClr val="000000"/>
+                </a:solidFill>
+                <a:latin typeface="Calibri"/>
+              </a:rPr>
+              <a:t>DIS Project</a:t>
             </a:r>
             <a:endParaRPr/>
           </a:p>
@@ -8138,15 +7133,15 @@
                 <a:spcPct val="100000"/>
               </a:lnSpc>
             </a:pPr>
-            <a:r>
+            <a:fld id="{51F13101-A131-41F1-B1E1-C1D181513151}" type="slidenum">
               <a:rPr lang="en-US">
                 <a:solidFill>
                   <a:srgbClr val="000000"/>
                 </a:solidFill>
                 <a:latin typeface="Calibri"/>
               </a:rPr>
-              <a:t>15/12/2015</a:t>
-            </a:r>
+              <a:t>&lt;number&gt;</a:t>
+            </a:fld>
             <a:endParaRPr/>
           </a:p>
         </p:txBody>
@@ -8159,15 +7154,15 @@
         </p:nvSpPr>
         <p:spPr>
           <a:xfrm>
-            <a:off x="0" y="0"/>
-            <a:ext cx="-11796840" cy="-11796840"/>
-          </a:xfrm>
-          <a:prstGeom prst="rect">
-            <a:avLst/>
-          </a:prstGeom>
-        </p:spPr>
-        <p:txBody>
-          <a:bodyPr bIns="45000" lIns="90000" rIns="90000" tIns="45000"/>
+            <a:off x="1097280" y="1846440"/>
+            <a:ext cx="4937400" cy="735840"/>
+          </a:xfrm>
+          <a:prstGeom prst="rect">
+            <a:avLst/>
+          </a:prstGeom>
+        </p:spPr>
+        <p:txBody>
+          <a:bodyPr anchor="ctr"/>
           <a:p>
             <a:pPr>
               <a:lnSpc>
@@ -8175,13 +7170,13 @@
               </a:lnSpc>
             </a:pPr>
             <a:r>
-              <a:rPr lang="en-US">
-                <a:solidFill>
-                  <a:srgbClr val="000000"/>
-                </a:solidFill>
-                <a:latin typeface="Calibri"/>
-              </a:rPr>
-              <a:t>DIS Project</a:t>
+              <a:rPr lang="en-US" sz="2000">
+                <a:solidFill>
+                  <a:srgbClr val="637052"/>
+                </a:solidFill>
+                <a:latin typeface="Calibri"/>
+              </a:rPr>
+              <a:t>Metric 1 (event/time)</a:t>
             </a:r>
             <a:endParaRPr/>
           </a:p>
@@ -8195,68 +7190,109 @@
         </p:nvSpPr>
         <p:spPr>
           <a:xfrm>
-            <a:off x="0" y="0"/>
-            <a:ext cx="-11796840" cy="-11796840"/>
-          </a:xfrm>
-          <a:prstGeom prst="rect">
-            <a:avLst/>
-          </a:prstGeom>
-        </p:spPr>
-        <p:txBody>
-          <a:bodyPr bIns="45000" lIns="90000" rIns="90000" tIns="45000"/>
+            <a:off x="6217560" y="1847520"/>
+            <a:ext cx="4937400" cy="735840"/>
+          </a:xfrm>
+          <a:prstGeom prst="rect">
+            <a:avLst/>
+          </a:prstGeom>
+        </p:spPr>
+        <p:txBody>
+          <a:bodyPr anchor="ctr"/>
           <a:p>
             <a:pPr>
               <a:lnSpc>
                 <a:spcPct val="100000"/>
               </a:lnSpc>
             </a:pPr>
-            <a:fld id="{6171E1F1-D131-41E1-9101-71613161E141}" type="slidenum">
-              <a:rPr lang="en-US">
-                <a:solidFill>
-                  <a:srgbClr val="000000"/>
-                </a:solidFill>
-                <a:latin typeface="Calibri"/>
-              </a:rPr>
-              <a:t>&lt;number&gt;</a:t>
-            </a:fld>
-            <a:endParaRPr/>
-          </a:p>
-        </p:txBody>
-      </p:sp>
-      <p:graphicFrame>
-        <p:nvGraphicFramePr>
-          <p:cNvPr id="188" name="Espace réservé du contenu 13"/>
-          <p:cNvGraphicFramePr/>
+            <a:r>
+              <a:rPr lang="en-US" sz="2000">
+                <a:solidFill>
+                  <a:srgbClr val="637052"/>
+                </a:solidFill>
+                <a:latin typeface="Calibri"/>
+              </a:rPr>
+              <a:t>Metric 2 (distance/event)</a:t>
+            </a:r>
+            <a:endParaRPr/>
+          </a:p>
+        </p:txBody>
+      </p:sp>
+      <p:pic>
+        <p:nvPicPr>
+          <p:cNvPr descr="" id="188" name=""/>
+          <p:cNvPicPr/>
           <p:nvPr/>
-        </p:nvGraphicFramePr>
-        <p:xfrm>
-          <a:off x="1096920" y="2583000"/>
-          <a:ext cx="4938480" cy="3377880"/>
-        </p:xfrm>
-        <a:graphic>
-          <a:graphicData uri="http://schemas.openxmlformats.org/drawingml/2006/chart">
-            <c:chart xmlns:c="http://schemas.openxmlformats.org/drawingml/2006/chart" xmlns:r="http://schemas.openxmlformats.org/officeDocument/2006/relationships" r:id="rId1"/>
-          </a:graphicData>
-        </a:graphic>
-      </p:graphicFrame>
-      <p:graphicFrame>
-        <p:nvGraphicFramePr>
-          <p:cNvPr id="189" name="Espace réservé du contenu 15"/>
-          <p:cNvGraphicFramePr/>
+        </p:nvPicPr>
+        <p:blipFill>
+          <a:blip r:embed="rId1"/>
+          <a:stretch>
+            <a:fillRect/>
+          </a:stretch>
+        </p:blipFill>
+        <p:spPr>
+          <a:xfrm>
+            <a:off x="640080" y="2736720"/>
+            <a:ext cx="5403600" cy="2749680"/>
+          </a:xfrm>
+          <a:prstGeom prst="rect">
+            <a:avLst/>
+          </a:prstGeom>
+        </p:spPr>
+      </p:pic>
+      <p:pic>
+        <p:nvPicPr>
+          <p:cNvPr descr="" id="189" name=""/>
+          <p:cNvPicPr/>
           <p:nvPr/>
-        </p:nvGraphicFramePr>
-        <p:xfrm>
-          <a:off x="6218280" y="2583000"/>
-          <a:ext cx="4936680" cy="3377880"/>
-        </p:xfrm>
-        <a:graphic>
-          <a:graphicData uri="http://schemas.openxmlformats.org/drawingml/2006/chart">
-            <c:chart xmlns:c="http://schemas.openxmlformats.org/drawingml/2006/chart" xmlns:r="http://schemas.openxmlformats.org/officeDocument/2006/relationships" r:id="rId2"/>
-          </a:graphicData>
-        </a:graphic>
-      </p:graphicFrame>
+        </p:nvPicPr>
+        <p:blipFill>
+          <a:blip r:embed="rId2"/>
+          <a:stretch>
+            <a:fillRect/>
+          </a:stretch>
+        </p:blipFill>
+        <p:spPr>
+          <a:xfrm>
+            <a:off x="6199200" y="2741400"/>
+            <a:ext cx="5403600" cy="2740320"/>
+          </a:xfrm>
+          <a:prstGeom prst="rect">
+            <a:avLst/>
+          </a:prstGeom>
+        </p:spPr>
+      </p:pic>
     </p:spTree>
   </p:cSld>
+  <p:timing>
+    <p:tnLst>
+      <p:par>
+        <p:cTn dur="indefinite" id="5" nodeType="tmRoot" restart="never">
+          <p:childTnLst>
+            <p:seq>
+              <p:cTn id="6" nodeType="mainSeq">
+                <p:childTnLst/>
+              </p:cTn>
+              <p:prevCondLst>
+                <p:cond delay="0" evt="onPrev">
+                  <p:tgtEl>
+                    <p:sldTgt/>
+                  </p:tgtEl>
+                </p:cond>
+              </p:prevCondLst>
+              <p:nextCondLst>
+                <p:cond delay="0" evt="onNext">
+                  <p:tgtEl>
+                    <p:sldTgt/>
+                  </p:tgtEl>
+                </p:cond>
+              </p:nextCondLst>
+            </p:seq>
+          </p:childTnLst>
+        </p:cTn>
+      </p:par>
+    </p:tnLst>
+  </p:timing>
 </p:sld>
 </file>
 
@@ -8321,15 +7357,15 @@
         </p:nvSpPr>
         <p:spPr>
           <a:xfrm>
-            <a:off x="1097280" y="1846080"/>
-            <a:ext cx="4937400" cy="735840"/>
-          </a:xfrm>
-          <a:prstGeom prst="rect">
-            <a:avLst/>
-          </a:prstGeom>
-        </p:spPr>
-        <p:txBody>
-          <a:bodyPr anchor="ctr"/>
+            <a:off x="0" y="0"/>
+            <a:ext cx="-11796840" cy="-11796840"/>
+          </a:xfrm>
+          <a:prstGeom prst="rect">
+            <a:avLst/>
+          </a:prstGeom>
+        </p:spPr>
+        <p:txBody>
+          <a:bodyPr bIns="45000" lIns="90000" rIns="90000" tIns="45000"/>
           <a:p>
             <a:pPr>
               <a:lnSpc>
@@ -8337,13 +7373,13 @@
               </a:lnSpc>
             </a:pPr>
             <a:r>
-              <a:rPr lang="en-US" sz="2000">
-                <a:solidFill>
-                  <a:srgbClr val="637052"/>
-                </a:solidFill>
-                <a:latin typeface="Calibri"/>
-              </a:rPr>
-              <a:t>Metric 1</a:t>
+              <a:rPr lang="en-US">
+                <a:solidFill>
+                  <a:srgbClr val="000000"/>
+                </a:solidFill>
+                <a:latin typeface="Calibri"/>
+              </a:rPr>
+              <a:t>15/12/2015</a:t>
             </a:r>
             <a:endParaRPr/>
           </a:p>
@@ -8357,29 +7393,29 @@
         </p:nvSpPr>
         <p:spPr>
           <a:xfrm>
-            <a:off x="6217920" y="1846080"/>
-            <a:ext cx="4937400" cy="735840"/>
-          </a:xfrm>
-          <a:prstGeom prst="rect">
-            <a:avLst/>
-          </a:prstGeom>
-        </p:spPr>
-        <p:txBody>
-          <a:bodyPr anchor="ctr"/>
-          <a:p>
-            <a:pPr algn="ctr">
+            <a:off x="0" y="0"/>
+            <a:ext cx="-11796840" cy="-11796840"/>
+          </a:xfrm>
+          <a:prstGeom prst="rect">
+            <a:avLst/>
+          </a:prstGeom>
+        </p:spPr>
+        <p:txBody>
+          <a:bodyPr bIns="45000" lIns="90000" rIns="90000" tIns="45000"/>
+          <a:p>
+            <a:pPr>
               <a:lnSpc>
                 <a:spcPct val="100000"/>
               </a:lnSpc>
             </a:pPr>
             <a:r>
-              <a:rPr lang="en-US" sz="2000">
-                <a:solidFill>
-                  <a:srgbClr val="637052"/>
-                </a:solidFill>
-                <a:latin typeface="Calibri"/>
-              </a:rPr>
-              <a:t>Metric 2</a:t>
+              <a:rPr lang="en-US">
+                <a:solidFill>
+                  <a:srgbClr val="000000"/>
+                </a:solidFill>
+                <a:latin typeface="Calibri"/>
+              </a:rPr>
+              <a:t>DIS Project</a:t>
             </a:r>
             <a:endParaRPr/>
           </a:p>
@@ -8408,15 +7444,15 @@
                 <a:spcPct val="100000"/>
               </a:lnSpc>
             </a:pPr>
-            <a:r>
+            <a:fld id="{C1B1D111-9101-4161-A1B1-51E1C1311111}" type="slidenum">
               <a:rPr lang="en-US">
                 <a:solidFill>
                   <a:srgbClr val="000000"/>
                 </a:solidFill>
                 <a:latin typeface="Calibri"/>
               </a:rPr>
-              <a:t>15/12/2015</a:t>
-            </a:r>
+              <a:t>&lt;number&gt;</a:t>
+            </a:fld>
             <a:endParaRPr/>
           </a:p>
         </p:txBody>
@@ -8429,15 +7465,15 @@
         </p:nvSpPr>
         <p:spPr>
           <a:xfrm>
-            <a:off x="0" y="0"/>
-            <a:ext cx="-11796840" cy="-11796840"/>
-          </a:xfrm>
-          <a:prstGeom prst="rect">
-            <a:avLst/>
-          </a:prstGeom>
-        </p:spPr>
-        <p:txBody>
-          <a:bodyPr bIns="45000" lIns="90000" rIns="90000" tIns="45000"/>
+            <a:off x="1097280" y="1846440"/>
+            <a:ext cx="4937400" cy="735840"/>
+          </a:xfrm>
+          <a:prstGeom prst="rect">
+            <a:avLst/>
+          </a:prstGeom>
+        </p:spPr>
+        <p:txBody>
+          <a:bodyPr anchor="ctr"/>
           <a:p>
             <a:pPr>
               <a:lnSpc>
@@ -8445,13 +7481,13 @@
               </a:lnSpc>
             </a:pPr>
             <a:r>
-              <a:rPr lang="en-US">
-                <a:solidFill>
-                  <a:srgbClr val="000000"/>
-                </a:solidFill>
-                <a:latin typeface="Calibri"/>
-              </a:rPr>
-              <a:t>DIS Project</a:t>
+              <a:rPr lang="en-US" sz="2000">
+                <a:solidFill>
+                  <a:srgbClr val="637052"/>
+                </a:solidFill>
+                <a:latin typeface="Calibri"/>
+              </a:rPr>
+              <a:t>Metric 1 (event/time)</a:t>
             </a:r>
             <a:endParaRPr/>
           </a:p>
@@ -8465,68 +7501,109 @@
         </p:nvSpPr>
         <p:spPr>
           <a:xfrm>
-            <a:off x="0" y="0"/>
-            <a:ext cx="-11796840" cy="-11796840"/>
-          </a:xfrm>
-          <a:prstGeom prst="rect">
-            <a:avLst/>
-          </a:prstGeom>
-        </p:spPr>
-        <p:txBody>
-          <a:bodyPr bIns="45000" lIns="90000" rIns="90000" tIns="45000"/>
+            <a:off x="6217560" y="1847520"/>
+            <a:ext cx="4937400" cy="735840"/>
+          </a:xfrm>
+          <a:prstGeom prst="rect">
+            <a:avLst/>
+          </a:prstGeom>
+        </p:spPr>
+        <p:txBody>
+          <a:bodyPr anchor="ctr"/>
           <a:p>
             <a:pPr>
               <a:lnSpc>
                 <a:spcPct val="100000"/>
               </a:lnSpc>
             </a:pPr>
-            <a:fld id="{916101B1-C161-41D1-B131-612121516151}" type="slidenum">
-              <a:rPr lang="en-US">
-                <a:solidFill>
-                  <a:srgbClr val="000000"/>
-                </a:solidFill>
-                <a:latin typeface="Calibri"/>
-              </a:rPr>
-              <a:t>&lt;number&gt;</a:t>
-            </a:fld>
-            <a:endParaRPr/>
-          </a:p>
-        </p:txBody>
-      </p:sp>
-      <p:graphicFrame>
-        <p:nvGraphicFramePr>
-          <p:cNvPr id="196" name="Espace réservé du contenu 13"/>
-          <p:cNvGraphicFramePr/>
+            <a:r>
+              <a:rPr lang="en-US" sz="2000">
+                <a:solidFill>
+                  <a:srgbClr val="637052"/>
+                </a:solidFill>
+                <a:latin typeface="Calibri"/>
+              </a:rPr>
+              <a:t>Metric 2 (distance/event)</a:t>
+            </a:r>
+            <a:endParaRPr/>
+          </a:p>
+        </p:txBody>
+      </p:sp>
+      <p:pic>
+        <p:nvPicPr>
+          <p:cNvPr descr="" id="196" name=""/>
+          <p:cNvPicPr/>
           <p:nvPr/>
-        </p:nvGraphicFramePr>
-        <p:xfrm>
-          <a:off x="1096920" y="2583000"/>
-          <a:ext cx="4938480" cy="3377880"/>
-        </p:xfrm>
-        <a:graphic>
-          <a:graphicData uri="http://schemas.openxmlformats.org/drawingml/2006/chart">
-            <c:chart xmlns:c="http://schemas.openxmlformats.org/drawingml/2006/chart" xmlns:r="http://schemas.openxmlformats.org/officeDocument/2006/relationships" r:id="rId1"/>
-          </a:graphicData>
-        </a:graphic>
-      </p:graphicFrame>
-      <p:graphicFrame>
-        <p:nvGraphicFramePr>
-          <p:cNvPr id="197" name="Espace réservé du contenu 14"/>
-          <p:cNvGraphicFramePr/>
+        </p:nvPicPr>
+        <p:blipFill>
+          <a:blip r:embed="rId1"/>
+          <a:stretch>
+            <a:fillRect/>
+          </a:stretch>
+        </p:blipFill>
+        <p:spPr>
+          <a:xfrm>
+            <a:off x="640080" y="2743200"/>
+            <a:ext cx="5438160" cy="2743200"/>
+          </a:xfrm>
+          <a:prstGeom prst="rect">
+            <a:avLst/>
+          </a:prstGeom>
+        </p:spPr>
+      </p:pic>
+      <p:pic>
+        <p:nvPicPr>
+          <p:cNvPr descr="" id="197" name=""/>
+          <p:cNvPicPr/>
           <p:nvPr/>
-        </p:nvGraphicFramePr>
-        <p:xfrm>
-          <a:off x="6218280" y="2583000"/>
-          <a:ext cx="4936680" cy="3377880"/>
-        </p:xfrm>
-        <a:graphic>
-          <a:graphicData uri="http://schemas.openxmlformats.org/drawingml/2006/chart">
-            <c:chart xmlns:c="http://schemas.openxmlformats.org/drawingml/2006/chart" xmlns:r="http://schemas.openxmlformats.org/officeDocument/2006/relationships" r:id="rId2"/>
-          </a:graphicData>
-        </a:graphic>
-      </p:graphicFrame>
+        </p:nvPicPr>
+        <p:blipFill>
+          <a:blip r:embed="rId2"/>
+          <a:stretch>
+            <a:fillRect/>
+          </a:stretch>
+        </p:blipFill>
+        <p:spPr>
+          <a:xfrm>
+            <a:off x="6121800" y="2752920"/>
+            <a:ext cx="5447520" cy="2723760"/>
+          </a:xfrm>
+          <a:prstGeom prst="rect">
+            <a:avLst/>
+          </a:prstGeom>
+        </p:spPr>
+      </p:pic>
     </p:spTree>
   </p:cSld>
+  <p:timing>
+    <p:tnLst>
+      <p:par>
+        <p:cTn dur="indefinite" id="7" nodeType="tmRoot" restart="never">
+          <p:childTnLst>
+            <p:seq>
+              <p:cTn id="8" nodeType="mainSeq">
+                <p:childTnLst/>
+              </p:cTn>
+              <p:prevCondLst>
+                <p:cond delay="0" evt="onPrev">
+                  <p:tgtEl>
+                    <p:sldTgt/>
+                  </p:tgtEl>
+                </p:cond>
+              </p:prevCondLst>
+              <p:nextCondLst>
+                <p:cond delay="0" evt="onNext">
+                  <p:tgtEl>
+                    <p:sldTgt/>
+                  </p:tgtEl>
+                </p:cond>
+              </p:nextCondLst>
+            </p:seq>
+          </p:childTnLst>
+        </p:cTn>
+      </p:par>
+    </p:tnLst>
+  </p:timing>
 </p:sld>
 </file>
 
@@ -8577,7 +7654,7 @@
                 </a:solidFill>
                 <a:latin typeface="Calibri Light"/>
               </a:rPr>
-              <a:t>Public case : communication</a:t>
+              <a:t>Results: Specialization</a:t>
             </a:r>
             <a:endParaRPr/>
           </a:p>
@@ -8591,263 +7668,30 @@
         </p:nvSpPr>
         <p:spPr>
           <a:xfrm>
-            <a:off x="1097280" y="1845720"/>
-            <a:ext cx="10058040" cy="4023000"/>
-          </a:xfrm>
-          <a:prstGeom prst="rect">
-            <a:avLst/>
-          </a:prstGeom>
-        </p:spPr>
-        <p:txBody>
-          <a:bodyPr lIns="0" rIns="0"/>
-          <a:p>
-            <a:pPr lvl="1">
+            <a:off x="0" y="0"/>
+            <a:ext cx="-11796840" cy="-11796840"/>
+          </a:xfrm>
+          <a:prstGeom prst="rect">
+            <a:avLst/>
+          </a:prstGeom>
+        </p:spPr>
+        <p:txBody>
+          <a:bodyPr bIns="45000" lIns="90000" rIns="90000" tIns="45000"/>
+          <a:p>
+            <a:pPr>
               <a:lnSpc>
                 <a:spcPct val="100000"/>
               </a:lnSpc>
-              <a:buFont typeface="Calibri"/>
-              <a:buChar char="◦"/>
             </a:pPr>
             <a:r>
               <a:rPr lang="en-US">
                 <a:solidFill>
-                  <a:srgbClr val="404040"/>
-                </a:solidFill>
-                <a:latin typeface="Calibri"/>
-              </a:rPr>
-              <a:t>3 channels, one for each color </a:t>
-            </a:r>
-            <a:endParaRPr/>
-          </a:p>
-          <a:p>
-            <a:endParaRPr/>
-          </a:p>
-          <a:p>
-            <a:pPr lvl="1">
-              <a:lnSpc>
-                <a:spcPct val="100000"/>
-              </a:lnSpc>
-              <a:buFont typeface="Calibri"/>
-              <a:buChar char="◦"/>
-            </a:pPr>
-            <a:r>
-              <a:rPr lang="en-US">
-                <a:solidFill>
-                  <a:srgbClr val="404040"/>
-                </a:solidFill>
-                <a:latin typeface="Calibri"/>
-              </a:rPr>
-              <a:t>Send only the chosen color, and listen on all channels</a:t>
-            </a:r>
-            <a:endParaRPr/>
-          </a:p>
-          <a:p>
-            <a:endParaRPr/>
-          </a:p>
-          <a:p>
-            <a:pPr lvl="1">
-              <a:lnSpc>
-                <a:spcPct val="100000"/>
-              </a:lnSpc>
-              <a:buFont typeface="Calibri"/>
-              <a:buChar char="◦"/>
-            </a:pPr>
-            <a:r>
-              <a:rPr lang="en-US">
-                <a:solidFill>
-                  <a:srgbClr val="404040"/>
-                </a:solidFill>
-                <a:latin typeface="Calibri"/>
-              </a:rPr>
-              <a:t>Signal strength </a:t>
-            </a:r>
-            <a:endParaRPr/>
-          </a:p>
-          <a:p>
-            <a:endParaRPr/>
-          </a:p>
-          <a:p>
-            <a:pPr lvl="1">
-              <a:lnSpc>
-                <a:spcPct val="100000"/>
-              </a:lnSpc>
-              <a:buFont typeface="Calibri"/>
-              <a:buChar char="◦"/>
-            </a:pPr>
-            <a:r>
-              <a:rPr lang="en-US">
-                <a:solidFill>
-                  <a:srgbClr val="404040"/>
-                </a:solidFill>
-                <a:latin typeface="Calibri"/>
-              </a:rPr>
-              <a:t>Normalization</a:t>
-            </a:r>
-            <a:endParaRPr/>
-          </a:p>
-          <a:p>
-            <a:pPr lvl="1">
-              <a:buFont typeface="Calibri"/>
-              <a:buChar char="◦"/>
-            </a:pPr>
-            <a:r>
-              <a:rPr lang="en-US" sz="1400">
-                <a:solidFill>
-                  <a:srgbClr val="404040"/>
-                </a:solidFill>
-                <a:latin typeface="Calibri"/>
-              </a:rPr>
-              <a:t>Limited communication range: </a:t>
-            </a:r>
-            <a:r>
-              <a:rPr lang="en-US" sz="1400">
-                <a:solidFill>
-                  <a:srgbClr val="404040"/>
-                </a:solidFill>
-                <a:latin typeface="Calibri"/>
-              </a:rPr>
-              <a:t>	</a:t>
-            </a:r>
-            <a:r>
-              <a:rPr lang="en-US" sz="1400">
-                <a:solidFill>
-                  <a:srgbClr val="404040"/>
-                </a:solidFill>
-                <a:latin typeface="Calibri"/>
-              </a:rPr>
-              <a:t>	</a:t>
-            </a:r>
-            <a:r>
-              <a:rPr lang="en-US" sz="1400">
-                <a:solidFill>
-                  <a:srgbClr val="404040"/>
-                </a:solidFill>
-                <a:latin typeface="Calibri"/>
-              </a:rPr>
-              <a:t> </a:t>
-            </a:r>
-            <a:r>
-              <a:rPr lang="en-US" sz="1400">
-                <a:solidFill>
-                  <a:srgbClr val="404040"/>
-                </a:solidFill>
-                <a:latin typeface="Calibri"/>
-              </a:rPr>
-              <a:t>	</a:t>
-            </a:r>
-            <a:r>
-              <a:rPr lang="en-US" sz="1400">
-                <a:solidFill>
-                  <a:srgbClr val="404040"/>
-                </a:solidFill>
-                <a:latin typeface="Calibri"/>
-              </a:rPr>
-              <a:t>	</a:t>
-            </a:r>
-            <a:r>
-              <a:rPr lang="en-US" sz="1400">
-                <a:solidFill>
-                  <a:srgbClr val="404040"/>
-                </a:solidFill>
-                <a:latin typeface="Calibri"/>
-              </a:rPr>
-              <a:t>if </a:t>
-            </a:r>
-            <a:endParaRPr/>
-          </a:p>
-          <a:p>
-            <a:pPr lvl="1">
-              <a:buFont typeface="Calibri"/>
-              <a:buChar char="◦"/>
-            </a:pPr>
-            <a:r>
-              <a:rPr lang="en-US" sz="1400">
-                <a:solidFill>
-                  <a:srgbClr val="404040"/>
-                </a:solidFill>
-                <a:latin typeface="Calibri"/>
-              </a:rPr>
-              <a:t>Saturation if under a certain range:</a:t>
-            </a:r>
-            <a:r>
-              <a:rPr lang="en-US" sz="1400">
-                <a:solidFill>
-                  <a:srgbClr val="404040"/>
-                </a:solidFill>
-                <a:latin typeface="Calibri"/>
-              </a:rPr>
-              <a:t>	</a:t>
-            </a:r>
-            <a:r>
-              <a:rPr lang="en-US" sz="1400">
-                <a:solidFill>
-                  <a:srgbClr val="404040"/>
-                </a:solidFill>
-                <a:latin typeface="Calibri"/>
-              </a:rPr>
-              <a:t>	</a:t>
-            </a:r>
-            <a:r>
-              <a:rPr lang="en-US" sz="1400">
-                <a:solidFill>
-                  <a:srgbClr val="404040"/>
-                </a:solidFill>
-                <a:latin typeface="Calibri"/>
-              </a:rPr>
-              <a:t> </a:t>
-            </a:r>
-            <a:r>
-              <a:rPr lang="en-US" sz="1400">
-                <a:solidFill>
-                  <a:srgbClr val="404040"/>
-                </a:solidFill>
-                <a:latin typeface="Calibri"/>
-              </a:rPr>
-              <a:t>	</a:t>
-            </a:r>
-            <a:r>
-              <a:rPr lang="en-US" sz="1400">
-                <a:solidFill>
-                  <a:srgbClr val="404040"/>
-                </a:solidFill>
-                <a:latin typeface="Calibri"/>
-              </a:rPr>
-              <a:t>	</a:t>
-            </a:r>
-            <a:r>
-              <a:rPr lang="en-US" sz="1400">
-                <a:solidFill>
-                  <a:srgbClr val="404040"/>
-                </a:solidFill>
-                <a:latin typeface="Calibri"/>
-              </a:rPr>
-              <a:t>if </a:t>
-            </a:r>
-            <a:endParaRPr/>
-          </a:p>
-          <a:p>
-            <a:endParaRPr/>
-          </a:p>
-          <a:p>
-            <a:pPr lvl="1">
-              <a:lnSpc>
-                <a:spcPct val="100000"/>
-              </a:lnSpc>
-              <a:buFont typeface="Calibri"/>
-              <a:buChar char="◦"/>
-            </a:pPr>
-            <a:r>
-              <a:rPr lang="en-US">
-                <a:solidFill>
-                  <a:srgbClr val="404040"/>
-                </a:solidFill>
-                <a:latin typeface="Calibri"/>
-              </a:rPr>
-              <a:t>New stimulus:</a:t>
-            </a:r>
-            <a:endParaRPr/>
-          </a:p>
-          <a:p>
+                  <a:srgbClr val="000000"/>
+                </a:solidFill>
+                <a:latin typeface="Calibri"/>
+              </a:rPr>
+              <a:t>15/12/2015</a:t>
+            </a:r>
             <a:endParaRPr/>
           </a:p>
         </p:txBody>
@@ -8860,31 +7704,29 @@
         </p:nvSpPr>
         <p:spPr>
           <a:xfrm>
-            <a:off x="1097280" y="1845720"/>
-            <a:ext cx="10058040" cy="4023000"/>
-          </a:xfrm>
-          <a:prstGeom prst="rect">
-            <a:avLst/>
-          </a:prstGeom>
-        </p:spPr>
-        <p:txBody>
-          <a:bodyPr lIns="0" rIns="0"/>
+            <a:off x="0" y="0"/>
+            <a:ext cx="-11796840" cy="-11796840"/>
+          </a:xfrm>
+          <a:prstGeom prst="rect">
+            <a:avLst/>
+          </a:prstGeom>
+        </p:spPr>
+        <p:txBody>
+          <a:bodyPr bIns="45000" lIns="90000" rIns="90000" tIns="45000"/>
           <a:p>
             <a:pPr>
               <a:lnSpc>
-                <a:spcPct val="90000"/>
-              </a:lnSpc>
-              <a:buFont typeface="Calibri"/>
-              <a:buChar char=" "/>
-            </a:pPr>
-            <a:r>
-              <a:rPr lang="en-US" sz="2000">
-                <a:solidFill>
-                  <a:srgbClr val="404040"/>
-                </a:solidFill>
-                <a:latin typeface="Calibri"/>
-              </a:rPr>
-              <a:t> </a:t>
+                <a:spcPct val="100000"/>
+              </a:lnSpc>
+            </a:pPr>
+            <a:r>
+              <a:rPr lang="en-US">
+                <a:solidFill>
+                  <a:srgbClr val="000000"/>
+                </a:solidFill>
+                <a:latin typeface="Calibri"/>
+              </a:rPr>
+              <a:t>DIS Project</a:t>
             </a:r>
             <a:endParaRPr/>
           </a:p>
@@ -8913,15 +7755,15 @@
                 <a:spcPct val="100000"/>
               </a:lnSpc>
             </a:pPr>
-            <a:r>
+            <a:fld id="{514111F1-3171-41B1-9181-A1B1712161F1}" type="slidenum">
               <a:rPr lang="en-US">
                 <a:solidFill>
                   <a:srgbClr val="000000"/>
                 </a:solidFill>
                 <a:latin typeface="Calibri"/>
               </a:rPr>
-              <a:t>15/12/2015</a:t>
-            </a:r>
+              <a:t>&lt;number&gt;</a:t>
+            </a:fld>
             <a:endParaRPr/>
           </a:p>
         </p:txBody>
@@ -8934,15 +7776,15 @@
         </p:nvSpPr>
         <p:spPr>
           <a:xfrm>
-            <a:off x="0" y="0"/>
-            <a:ext cx="-11796840" cy="-11796840"/>
-          </a:xfrm>
-          <a:prstGeom prst="rect">
-            <a:avLst/>
-          </a:prstGeom>
-        </p:spPr>
-        <p:txBody>
-          <a:bodyPr bIns="45000" lIns="90000" rIns="90000" tIns="45000"/>
+            <a:off x="1097280" y="1846440"/>
+            <a:ext cx="4937400" cy="735840"/>
+          </a:xfrm>
+          <a:prstGeom prst="rect">
+            <a:avLst/>
+          </a:prstGeom>
+        </p:spPr>
+        <p:txBody>
+          <a:bodyPr anchor="ctr"/>
           <a:p>
             <a:pPr>
               <a:lnSpc>
@@ -8950,13 +7792,13 @@
               </a:lnSpc>
             </a:pPr>
             <a:r>
-              <a:rPr lang="en-US">
-                <a:solidFill>
-                  <a:srgbClr val="000000"/>
-                </a:solidFill>
-                <a:latin typeface="Calibri"/>
-              </a:rPr>
-              <a:t>DIS Project</a:t>
+              <a:rPr lang="en-US" sz="2000">
+                <a:solidFill>
+                  <a:srgbClr val="637052"/>
+                </a:solidFill>
+                <a:latin typeface="Calibri"/>
+              </a:rPr>
+              <a:t>Metric 1 (event/time)</a:t>
             </a:r>
             <a:endParaRPr/>
           </a:p>
@@ -8970,36 +7812,109 @@
         </p:nvSpPr>
         <p:spPr>
           <a:xfrm>
-            <a:off x="0" y="0"/>
-            <a:ext cx="-11796840" cy="-11796840"/>
-          </a:xfrm>
-          <a:prstGeom prst="rect">
-            <a:avLst/>
-          </a:prstGeom>
-        </p:spPr>
-        <p:txBody>
-          <a:bodyPr bIns="45000" lIns="90000" rIns="90000" tIns="45000"/>
+            <a:off x="6217560" y="1847520"/>
+            <a:ext cx="4937400" cy="735840"/>
+          </a:xfrm>
+          <a:prstGeom prst="rect">
+            <a:avLst/>
+          </a:prstGeom>
+        </p:spPr>
+        <p:txBody>
+          <a:bodyPr anchor="ctr"/>
           <a:p>
             <a:pPr>
               <a:lnSpc>
                 <a:spcPct val="100000"/>
               </a:lnSpc>
             </a:pPr>
-            <a:fld id="{11A11131-A111-4131-9131-51119131B111}" type="slidenum">
-              <a:rPr lang="en-US">
-                <a:solidFill>
-                  <a:srgbClr val="000000"/>
-                </a:solidFill>
-                <a:latin typeface="Calibri"/>
-              </a:rPr>
-              <a:t>&lt;number&gt;</a:t>
-            </a:fld>
-            <a:endParaRPr/>
-          </a:p>
-        </p:txBody>
-      </p:sp>
+            <a:r>
+              <a:rPr lang="en-US" sz="2000">
+                <a:solidFill>
+                  <a:srgbClr val="637052"/>
+                </a:solidFill>
+                <a:latin typeface="Calibri"/>
+              </a:rPr>
+              <a:t>Metric 2 (distance/event)</a:t>
+            </a:r>
+            <a:endParaRPr/>
+          </a:p>
+        </p:txBody>
+      </p:sp>
+      <p:pic>
+        <p:nvPicPr>
+          <p:cNvPr descr="" id="204" name=""/>
+          <p:cNvPicPr/>
+          <p:nvPr/>
+        </p:nvPicPr>
+        <p:blipFill>
+          <a:blip r:embed="rId1"/>
+          <a:stretch>
+            <a:fillRect/>
+          </a:stretch>
+        </p:blipFill>
+        <p:spPr>
+          <a:xfrm>
+            <a:off x="640080" y="2743200"/>
+            <a:ext cx="5438160" cy="2743200"/>
+          </a:xfrm>
+          <a:prstGeom prst="rect">
+            <a:avLst/>
+          </a:prstGeom>
+        </p:spPr>
+      </p:pic>
+      <p:pic>
+        <p:nvPicPr>
+          <p:cNvPr descr="" id="205" name=""/>
+          <p:cNvPicPr/>
+          <p:nvPr/>
+        </p:nvPicPr>
+        <p:blipFill>
+          <a:blip r:embed="rId2"/>
+          <a:stretch>
+            <a:fillRect/>
+          </a:stretch>
+        </p:blipFill>
+        <p:spPr>
+          <a:xfrm>
+            <a:off x="6121800" y="2752920"/>
+            <a:ext cx="5447520" cy="2723760"/>
+          </a:xfrm>
+          <a:prstGeom prst="rect">
+            <a:avLst/>
+          </a:prstGeom>
+        </p:spPr>
+      </p:pic>
     </p:spTree>
   </p:cSld>
+  <p:timing>
+    <p:tnLst>
+      <p:par>
+        <p:cTn dur="indefinite" id="9" nodeType="tmRoot" restart="never">
+          <p:childTnLst>
+            <p:seq>
+              <p:cTn id="10" nodeType="mainSeq">
+                <p:childTnLst/>
+              </p:cTn>
+              <p:prevCondLst>
+                <p:cond delay="0" evt="onPrev">
+                  <p:tgtEl>
+                    <p:sldTgt/>
+                  </p:tgtEl>
+                </p:cond>
+              </p:prevCondLst>
+              <p:nextCondLst>
+                <p:cond delay="0" evt="onNext">
+                  <p:tgtEl>
+                    <p:sldTgt/>
+                  </p:tgtEl>
+                </p:cond>
+              </p:nextCondLst>
+            </p:seq>
+          </p:childTnLst>
+        </p:cTn>
+      </p:par>
+    </p:tnLst>
+  </p:timing>
 </p:sld>
 </file>
 
@@ -9022,7 +7937,7 @@
       </p:grpSpPr>
       <p:sp>
         <p:nvSpPr>
-          <p:cNvPr id="204" name="TextShape 1"/>
+          <p:cNvPr id="206" name="TextShape 1"/>
           <p:cNvSpPr txBox="1"/>
           <p:nvPr/>
         </p:nvSpPr>
@@ -9050,15 +7965,15 @@
                 </a:solidFill>
                 <a:latin typeface="Calibri Light"/>
               </a:rPr>
-              <a:t>Public case</a:t>
-            </a:r>
-            <a:endParaRPr/>
-          </a:p>
-        </p:txBody>
-      </p:sp>
-      <p:sp>
-        <p:nvSpPr>
-          <p:cNvPr id="205" name="TextShape 2"/>
+              <a:t>Public case : communication</a:t>
+            </a:r>
+            <a:endParaRPr/>
+          </a:p>
+        </p:txBody>
+      </p:sp>
+      <p:sp>
+        <p:nvSpPr>
+          <p:cNvPr id="207" name="TextShape 2"/>
           <p:cNvSpPr txBox="1"/>
           <p:nvPr/>
         </p:nvSpPr>
@@ -9074,6 +7989,275 @@
         <p:txBody>
           <a:bodyPr lIns="0" rIns="0"/>
           <a:p>
+            <a:pPr lvl="1">
+              <a:lnSpc>
+                <a:spcPct val="100000"/>
+              </a:lnSpc>
+              <a:buFont typeface="Calibri"/>
+              <a:buChar char="◦"/>
+            </a:pPr>
+            <a:r>
+              <a:rPr lang="en-US">
+                <a:solidFill>
+                  <a:srgbClr val="404040"/>
+                </a:solidFill>
+                <a:latin typeface="Calibri"/>
+              </a:rPr>
+              <a:t>3 channels, one for each color </a:t>
+            </a:r>
+            <a:endParaRPr/>
+          </a:p>
+          <a:p>
+            <a:endParaRPr/>
+          </a:p>
+          <a:p>
+            <a:pPr lvl="1">
+              <a:lnSpc>
+                <a:spcPct val="100000"/>
+              </a:lnSpc>
+              <a:buFont typeface="Calibri"/>
+              <a:buChar char="◦"/>
+            </a:pPr>
+            <a:r>
+              <a:rPr lang="en-US">
+                <a:solidFill>
+                  <a:srgbClr val="404040"/>
+                </a:solidFill>
+                <a:latin typeface="Calibri"/>
+              </a:rPr>
+              <a:t>Send only the chosen color, and listen on all channels</a:t>
+            </a:r>
+            <a:endParaRPr/>
+          </a:p>
+          <a:p>
+            <a:endParaRPr/>
+          </a:p>
+          <a:p>
+            <a:pPr lvl="1">
+              <a:lnSpc>
+                <a:spcPct val="100000"/>
+              </a:lnSpc>
+              <a:buFont typeface="Calibri"/>
+              <a:buChar char="◦"/>
+            </a:pPr>
+            <a:r>
+              <a:rPr lang="en-US">
+                <a:solidFill>
+                  <a:srgbClr val="404040"/>
+                </a:solidFill>
+                <a:latin typeface="Calibri"/>
+              </a:rPr>
+              <a:t>Signal strength </a:t>
+            </a:r>
+            <a:endParaRPr/>
+          </a:p>
+          <a:p>
+            <a:endParaRPr/>
+          </a:p>
+          <a:p>
+            <a:pPr lvl="1">
+              <a:lnSpc>
+                <a:spcPct val="100000"/>
+              </a:lnSpc>
+              <a:buFont typeface="Calibri"/>
+              <a:buChar char="◦"/>
+            </a:pPr>
+            <a:r>
+              <a:rPr lang="en-US">
+                <a:solidFill>
+                  <a:srgbClr val="404040"/>
+                </a:solidFill>
+                <a:latin typeface="Calibri"/>
+              </a:rPr>
+              <a:t>Normalization</a:t>
+            </a:r>
+            <a:endParaRPr/>
+          </a:p>
+          <a:p>
+            <a:pPr lvl="1">
+              <a:buFont typeface="Calibri"/>
+              <a:buChar char="◦"/>
+            </a:pPr>
+            <a:r>
+              <a:rPr lang="en-US" sz="1400">
+                <a:solidFill>
+                  <a:srgbClr val="404040"/>
+                </a:solidFill>
+                <a:latin typeface="Calibri"/>
+              </a:rPr>
+              <a:t>Limited communication range: </a:t>
+            </a:r>
+            <a:r>
+              <a:rPr lang="en-US" sz="1400">
+                <a:solidFill>
+                  <a:srgbClr val="404040"/>
+                </a:solidFill>
+                <a:latin typeface="Calibri"/>
+              </a:rPr>
+              <a:t>	</a:t>
+            </a:r>
+            <a:r>
+              <a:rPr lang="en-US" sz="1400">
+                <a:solidFill>
+                  <a:srgbClr val="404040"/>
+                </a:solidFill>
+                <a:latin typeface="Calibri"/>
+              </a:rPr>
+              <a:t>	</a:t>
+            </a:r>
+            <a:r>
+              <a:rPr lang="en-US" sz="1400">
+                <a:solidFill>
+                  <a:srgbClr val="404040"/>
+                </a:solidFill>
+                <a:latin typeface="Calibri"/>
+              </a:rPr>
+              <a:t> </a:t>
+            </a:r>
+            <a:r>
+              <a:rPr lang="en-US" sz="1400">
+                <a:solidFill>
+                  <a:srgbClr val="404040"/>
+                </a:solidFill>
+                <a:latin typeface="Calibri"/>
+              </a:rPr>
+              <a:t>	</a:t>
+            </a:r>
+            <a:r>
+              <a:rPr lang="en-US" sz="1400">
+                <a:solidFill>
+                  <a:srgbClr val="404040"/>
+                </a:solidFill>
+                <a:latin typeface="Calibri"/>
+              </a:rPr>
+              <a:t>	</a:t>
+            </a:r>
+            <a:r>
+              <a:rPr lang="en-US" sz="1400">
+                <a:solidFill>
+                  <a:srgbClr val="404040"/>
+                </a:solidFill>
+                <a:latin typeface="Calibri"/>
+              </a:rPr>
+              <a:t>if </a:t>
+            </a:r>
+            <a:endParaRPr/>
+          </a:p>
+          <a:p>
+            <a:pPr lvl="1">
+              <a:buFont typeface="Calibri"/>
+              <a:buChar char="◦"/>
+            </a:pPr>
+            <a:r>
+              <a:rPr lang="en-US" sz="1400">
+                <a:solidFill>
+                  <a:srgbClr val="404040"/>
+                </a:solidFill>
+                <a:latin typeface="Calibri"/>
+              </a:rPr>
+              <a:t>Saturation if under a certain range:</a:t>
+            </a:r>
+            <a:r>
+              <a:rPr lang="en-US" sz="1400">
+                <a:solidFill>
+                  <a:srgbClr val="404040"/>
+                </a:solidFill>
+                <a:latin typeface="Calibri"/>
+              </a:rPr>
+              <a:t>	</a:t>
+            </a:r>
+            <a:r>
+              <a:rPr lang="en-US" sz="1400">
+                <a:solidFill>
+                  <a:srgbClr val="404040"/>
+                </a:solidFill>
+                <a:latin typeface="Calibri"/>
+              </a:rPr>
+              <a:t>	</a:t>
+            </a:r>
+            <a:r>
+              <a:rPr lang="en-US" sz="1400">
+                <a:solidFill>
+                  <a:srgbClr val="404040"/>
+                </a:solidFill>
+                <a:latin typeface="Calibri"/>
+              </a:rPr>
+              <a:t> </a:t>
+            </a:r>
+            <a:r>
+              <a:rPr lang="en-US" sz="1400">
+                <a:solidFill>
+                  <a:srgbClr val="404040"/>
+                </a:solidFill>
+                <a:latin typeface="Calibri"/>
+              </a:rPr>
+              <a:t>	</a:t>
+            </a:r>
+            <a:r>
+              <a:rPr lang="en-US" sz="1400">
+                <a:solidFill>
+                  <a:srgbClr val="404040"/>
+                </a:solidFill>
+                <a:latin typeface="Calibri"/>
+              </a:rPr>
+              <a:t>	</a:t>
+            </a:r>
+            <a:r>
+              <a:rPr lang="en-US" sz="1400">
+                <a:solidFill>
+                  <a:srgbClr val="404040"/>
+                </a:solidFill>
+                <a:latin typeface="Calibri"/>
+              </a:rPr>
+              <a:t>if </a:t>
+            </a:r>
+            <a:endParaRPr/>
+          </a:p>
+          <a:p>
+            <a:endParaRPr/>
+          </a:p>
+          <a:p>
+            <a:pPr lvl="1">
+              <a:lnSpc>
+                <a:spcPct val="100000"/>
+              </a:lnSpc>
+              <a:buFont typeface="Calibri"/>
+              <a:buChar char="◦"/>
+            </a:pPr>
+            <a:r>
+              <a:rPr lang="en-US">
+                <a:solidFill>
+                  <a:srgbClr val="404040"/>
+                </a:solidFill>
+                <a:latin typeface="Calibri"/>
+              </a:rPr>
+              <a:t>New stimulus:</a:t>
+            </a:r>
+            <a:endParaRPr/>
+          </a:p>
+          <a:p>
+            <a:endParaRPr/>
+          </a:p>
+        </p:txBody>
+      </p:sp>
+      <p:sp>
+        <p:nvSpPr>
+          <p:cNvPr id="208" name="TextShape 3"/>
+          <p:cNvSpPr txBox="1"/>
+          <p:nvPr/>
+        </p:nvSpPr>
+        <p:spPr>
+          <a:xfrm>
+            <a:off x="1097280" y="1845720"/>
+            <a:ext cx="10058040" cy="4023000"/>
+          </a:xfrm>
+          <a:prstGeom prst="rect">
+            <a:avLst/>
+          </a:prstGeom>
+        </p:spPr>
+        <p:txBody>
+          <a:bodyPr lIns="0" rIns="0"/>
+          <a:p>
             <a:pPr>
               <a:lnSpc>
                 <a:spcPct val="90000"/>
@@ -9088,91 +8272,15 @@
                 </a:solidFill>
                 <a:latin typeface="Calibri"/>
               </a:rPr>
-              <a:t>Parameters</a:t>
-            </a:r>
-            <a:endParaRPr/>
-          </a:p>
-          <a:p>
-            <a:pPr lvl="1">
-              <a:lnSpc>
-                <a:spcPct val="100000"/>
-              </a:lnSpc>
-              <a:buFont typeface="Calibri Light"/>
-              <a:buAutoNum type="alphaLcParenR"/>
-            </a:pPr>
-            <a:r>
-              <a:rPr lang="en-US">
-                <a:solidFill>
-                  <a:srgbClr val="404040"/>
-                </a:solidFill>
-                <a:latin typeface="Calibri"/>
-              </a:rPr>
-              <a:t>Roto</a:t>
-            </a:r>
-            <a:endParaRPr/>
-          </a:p>
-          <a:p>
-            <a:pPr lvl="1">
-              <a:lnSpc>
-                <a:spcPct val="100000"/>
-              </a:lnSpc>
-              <a:buFont typeface="Calibri Light"/>
-              <a:buAutoNum type="alphaLcParenR"/>
-            </a:pPr>
-            <a:r>
-              <a:rPr lang="en-US">
-                <a:solidFill>
-                  <a:srgbClr val="404040"/>
-                </a:solidFill>
-                <a:latin typeface="Calibri"/>
-              </a:rPr>
-              <a:t>Toto</a:t>
-            </a:r>
-            <a:endParaRPr/>
-          </a:p>
-          <a:p>
-            <a:pPr lvl="1">
-              <a:lnSpc>
-                <a:spcPct val="100000"/>
-              </a:lnSpc>
-              <a:buFont typeface="Calibri Light"/>
-              <a:buAutoNum type="alphaLcParenR"/>
-            </a:pPr>
-            <a:r>
-              <a:rPr lang="en-US">
-                <a:solidFill>
-                  <a:srgbClr val="404040"/>
-                </a:solidFill>
-                <a:latin typeface="Calibri"/>
-              </a:rPr>
-              <a:t>Toto</a:t>
-            </a:r>
-            <a:endParaRPr/>
-          </a:p>
-          <a:p>
-            <a:pPr lvl="1">
-              <a:lnSpc>
-                <a:spcPct val="100000"/>
-              </a:lnSpc>
-              <a:buFont typeface="Calibri Light"/>
-              <a:buAutoNum type="alphaLcParenR"/>
-            </a:pPr>
-            <a:r>
-              <a:rPr lang="en-US">
-                <a:solidFill>
-                  <a:srgbClr val="404040"/>
-                </a:solidFill>
-                <a:latin typeface="Calibri"/>
-              </a:rPr>
-              <a:t>toto</a:t>
-            </a:r>
-            <a:endParaRPr/>
-          </a:p>
-        </p:txBody>
-      </p:sp>
-      <p:sp>
-        <p:nvSpPr>
-          <p:cNvPr id="206" name="TextShape 3"/>
+              <a:t> </a:t>
+            </a:r>
+            <a:endParaRPr/>
+          </a:p>
+        </p:txBody>
+      </p:sp>
+      <p:sp>
+        <p:nvSpPr>
+          <p:cNvPr id="209" name="TextShape 4"/>
           <p:cNvSpPr txBox="1"/>
           <p:nvPr/>
         </p:nvSpPr>
@@ -9208,7 +8316,7 @@
       </p:sp>
       <p:sp>
         <p:nvSpPr>
-          <p:cNvPr id="207" name="TextShape 4"/>
+          <p:cNvPr id="210" name="TextShape 5"/>
           <p:cNvSpPr txBox="1"/>
           <p:nvPr/>
         </p:nvSpPr>
@@ -9244,7 +8352,7 @@
       </p:sp>
       <p:sp>
         <p:nvSpPr>
-          <p:cNvPr id="208" name="TextShape 5"/>
+          <p:cNvPr id="211" name="TextShape 6"/>
           <p:cNvSpPr txBox="1"/>
           <p:nvPr/>
         </p:nvSpPr>
@@ -9265,7 +8373,7 @@
                 <a:spcPct val="100000"/>
               </a:lnSpc>
             </a:pPr>
-            <a:fld id="{91518191-71A1-41B1-9181-B14141716131}" type="slidenum">
+            <a:fld id="{B1A171E1-21F1-4131-9161-5141A11151D1}" type="slidenum">
               <a:rPr lang="en-US">
                 <a:solidFill>
                   <a:srgbClr val="000000"/>
@@ -9302,7 +8410,7 @@
       </p:grpSpPr>
       <p:sp>
         <p:nvSpPr>
-          <p:cNvPr id="209" name="TextShape 1"/>
+          <p:cNvPr id="212" name="TextShape 1"/>
           <p:cNvSpPr txBox="1"/>
           <p:nvPr/>
         </p:nvSpPr>
@@ -9338,79 +8446,157 @@
       </p:sp>
       <p:sp>
         <p:nvSpPr>
-          <p:cNvPr id="210" name="TextShape 2"/>
+          <p:cNvPr id="213" name="TextShape 2"/>
           <p:cNvSpPr txBox="1"/>
           <p:nvPr/>
         </p:nvSpPr>
         <p:spPr>
           <a:xfrm>
-            <a:off x="1097280" y="1846080"/>
-            <a:ext cx="4937400" cy="735840"/>
-          </a:xfrm>
-          <a:prstGeom prst="rect">
-            <a:avLst/>
-          </a:prstGeom>
-        </p:spPr>
-        <p:txBody>
-          <a:bodyPr anchor="ctr"/>
+            <a:off x="1097280" y="1845720"/>
+            <a:ext cx="10058040" cy="4023000"/>
+          </a:xfrm>
+          <a:prstGeom prst="rect">
+            <a:avLst/>
+          </a:prstGeom>
+        </p:spPr>
+        <p:txBody>
+          <a:bodyPr lIns="0" rIns="0"/>
           <a:p>
             <a:pPr>
               <a:lnSpc>
+                <a:spcPct val="90000"/>
+              </a:lnSpc>
+              <a:buFont typeface="Calibri"/>
+              <a:buChar char=" "/>
+            </a:pPr>
+            <a:r>
+              <a:rPr lang="en-US" sz="2000">
+                <a:solidFill>
+                  <a:srgbClr val="404040"/>
+                </a:solidFill>
+                <a:latin typeface="Calibri"/>
+              </a:rPr>
+              <a:t>Parameters</a:t>
+            </a:r>
+            <a:endParaRPr/>
+          </a:p>
+          <a:p>
+            <a:pPr lvl="1">
+              <a:lnSpc>
                 <a:spcPct val="100000"/>
               </a:lnSpc>
-            </a:pPr>
-            <a:r>
-              <a:rPr lang="en-US" sz="2000">
-                <a:solidFill>
-                  <a:srgbClr val="637052"/>
-                </a:solidFill>
-                <a:latin typeface="Calibri"/>
-              </a:rPr>
-              <a:t>Metric 1</a:t>
-            </a:r>
-            <a:endParaRPr/>
-          </a:p>
-        </p:txBody>
-      </p:sp>
-      <p:sp>
-        <p:nvSpPr>
-          <p:cNvPr id="211" name="TextShape 3"/>
+              <a:buFont typeface="Calibri Light"/>
+              <a:buAutoNum type="alphaLcParenR"/>
+            </a:pPr>
+            <a:r>
+              <a:rPr lang="en-US">
+                <a:solidFill>
+                  <a:srgbClr val="404040"/>
+                </a:solidFill>
+                <a:latin typeface="Calibri"/>
+              </a:rPr>
+              <a:t>Roto</a:t>
+            </a:r>
+            <a:endParaRPr/>
+          </a:p>
+          <a:p>
+            <a:pPr lvl="1">
+              <a:lnSpc>
+                <a:spcPct val="100000"/>
+              </a:lnSpc>
+              <a:buFont typeface="Calibri Light"/>
+              <a:buAutoNum type="alphaLcParenR"/>
+            </a:pPr>
+            <a:r>
+              <a:rPr lang="en-US">
+                <a:solidFill>
+                  <a:srgbClr val="404040"/>
+                </a:solidFill>
+                <a:latin typeface="Calibri"/>
+              </a:rPr>
+              <a:t>Toto</a:t>
+            </a:r>
+            <a:endParaRPr/>
+          </a:p>
+          <a:p>
+            <a:pPr lvl="1">
+              <a:lnSpc>
+                <a:spcPct val="100000"/>
+              </a:lnSpc>
+              <a:buFont typeface="Calibri Light"/>
+              <a:buAutoNum type="alphaLcParenR"/>
+            </a:pPr>
+            <a:r>
+              <a:rPr lang="en-US">
+                <a:solidFill>
+                  <a:srgbClr val="404040"/>
+                </a:solidFill>
+                <a:latin typeface="Calibri"/>
+              </a:rPr>
+              <a:t>Toto</a:t>
+            </a:r>
+            <a:endParaRPr/>
+          </a:p>
+          <a:p>
+            <a:pPr lvl="1">
+              <a:lnSpc>
+                <a:spcPct val="100000"/>
+              </a:lnSpc>
+              <a:buFont typeface="Calibri Light"/>
+              <a:buAutoNum type="alphaLcParenR"/>
+            </a:pPr>
+            <a:r>
+              <a:rPr lang="en-US">
+                <a:solidFill>
+                  <a:srgbClr val="404040"/>
+                </a:solidFill>
+                <a:latin typeface="Calibri"/>
+              </a:rPr>
+              <a:t>toto</a:t>
+            </a:r>
+            <a:endParaRPr/>
+          </a:p>
+        </p:txBody>
+      </p:sp>
+      <p:sp>
+        <p:nvSpPr>
+          <p:cNvPr id="214" name="TextShape 3"/>
           <p:cNvSpPr txBox="1"/>
           <p:nvPr/>
         </p:nvSpPr>
         <p:spPr>
           <a:xfrm>
-            <a:off x="6217920" y="1846080"/>
-            <a:ext cx="4937400" cy="735840"/>
-          </a:xfrm>
-          <a:prstGeom prst="rect">
-            <a:avLst/>
-          </a:prstGeom>
-        </p:spPr>
-        <p:txBody>
-          <a:bodyPr anchor="ctr"/>
-          <a:p>
-            <a:pPr algn="ctr">
+            <a:off x="0" y="0"/>
+            <a:ext cx="-11796840" cy="-11796840"/>
+          </a:xfrm>
+          <a:prstGeom prst="rect">
+            <a:avLst/>
+          </a:prstGeom>
+        </p:spPr>
+        <p:txBody>
+          <a:bodyPr bIns="45000" lIns="90000" rIns="90000" tIns="45000"/>
+          <a:p>
+            <a:pPr>
               <a:lnSpc>
                 <a:spcPct val="100000"/>
               </a:lnSpc>
             </a:pPr>
             <a:r>
-              <a:rPr lang="en-US" sz="2000">
-                <a:solidFill>
-                  <a:srgbClr val="637052"/>
-                </a:solidFill>
-                <a:latin typeface="Calibri"/>
-              </a:rPr>
-              <a:t>Metric 2</a:t>
-            </a:r>
-            <a:endParaRPr/>
-          </a:p>
-        </p:txBody>
-      </p:sp>
-      <p:sp>
-        <p:nvSpPr>
-          <p:cNvPr id="212" name="TextShape 4"/>
+              <a:rPr lang="en-US">
+                <a:solidFill>
+                  <a:srgbClr val="000000"/>
+                </a:solidFill>
+                <a:latin typeface="Calibri"/>
+              </a:rPr>
+              <a:t>15/12/2015</a:t>
+            </a:r>
+            <a:endParaRPr/>
+          </a:p>
+        </p:txBody>
+      </p:sp>
+      <p:sp>
+        <p:nvSpPr>
+          <p:cNvPr id="215" name="TextShape 4"/>
           <p:cNvSpPr txBox="1"/>
           <p:nvPr/>
         </p:nvSpPr>
@@ -9438,15 +8624,15 @@
                 </a:solidFill>
                 <a:latin typeface="Calibri"/>
               </a:rPr>
-              <a:t>15/12/2015</a:t>
-            </a:r>
-            <a:endParaRPr/>
-          </a:p>
-        </p:txBody>
-      </p:sp>
-      <p:sp>
-        <p:nvSpPr>
-          <p:cNvPr id="213" name="TextShape 5"/>
+              <a:t>DIS Project</a:t>
+            </a:r>
+            <a:endParaRPr/>
+          </a:p>
+        </p:txBody>
+      </p:sp>
+      <p:sp>
+        <p:nvSpPr>
+          <p:cNvPr id="216" name="TextShape 5"/>
           <p:cNvSpPr txBox="1"/>
           <p:nvPr/>
         </p:nvSpPr>
@@ -9467,43 +8653,7 @@
                 <a:spcPct val="100000"/>
               </a:lnSpc>
             </a:pPr>
-            <a:r>
-              <a:rPr lang="en-US">
-                <a:solidFill>
-                  <a:srgbClr val="000000"/>
-                </a:solidFill>
-                <a:latin typeface="Calibri"/>
-              </a:rPr>
-              <a:t>DIS Project</a:t>
-            </a:r>
-            <a:endParaRPr/>
-          </a:p>
-        </p:txBody>
-      </p:sp>
-      <p:sp>
-        <p:nvSpPr>
-          <p:cNvPr id="214" name="TextShape 6"/>
-          <p:cNvSpPr txBox="1"/>
-          <p:nvPr/>
-        </p:nvSpPr>
-        <p:spPr>
-          <a:xfrm>
-            <a:off x="0" y="0"/>
-            <a:ext cx="-11796840" cy="-11796840"/>
-          </a:xfrm>
-          <a:prstGeom prst="rect">
-            <a:avLst/>
-          </a:prstGeom>
-        </p:spPr>
-        <p:txBody>
-          <a:bodyPr bIns="45000" lIns="90000" rIns="90000" tIns="45000"/>
-          <a:p>
-            <a:pPr>
-              <a:lnSpc>
-                <a:spcPct val="100000"/>
-              </a:lnSpc>
-            </a:pPr>
-            <a:fld id="{61914101-31E1-4111-81D1-5141411131A1}" type="slidenum">
+            <a:fld id="{51B1D1D1-5111-41A1-A181-51C1D111E131}" type="slidenum">
               <a:rPr lang="en-US">
                 <a:solidFill>
                   <a:srgbClr val="000000"/>
@@ -9516,38 +8666,6 @@
           </a:p>
         </p:txBody>
       </p:sp>
-      <p:graphicFrame>
-        <p:nvGraphicFramePr>
-          <p:cNvPr id="215" name="Espace réservé du contenu 13"/>
-          <p:cNvGraphicFramePr/>
-          <p:nvPr/>
-        </p:nvGraphicFramePr>
-        <p:xfrm>
-          <a:off x="1096920" y="2583000"/>
-          <a:ext cx="4938480" cy="3377880"/>
-        </p:xfrm>
-        <a:graphic>
-          <a:graphicData uri="http://schemas.openxmlformats.org/drawingml/2006/chart">
-            <c:chart xmlns:c="http://schemas.openxmlformats.org/drawingml/2006/chart" xmlns:r="http://schemas.openxmlformats.org/officeDocument/2006/relationships" r:id="rId1"/>
-          </a:graphicData>
-        </a:graphic>
-      </p:graphicFrame>
-      <p:graphicFrame>
-        <p:nvGraphicFramePr>
-          <p:cNvPr id="216" name="Espace réservé du contenu 14"/>
-          <p:cNvGraphicFramePr/>
-          <p:nvPr/>
-        </p:nvGraphicFramePr>
-        <p:xfrm>
-          <a:off x="6218280" y="2583000"/>
-          <a:ext cx="4936680" cy="3377880"/>
-        </p:xfrm>
-        <a:graphic>
-          <a:graphicData uri="http://schemas.openxmlformats.org/drawingml/2006/chart">
-            <c:chart xmlns:c="http://schemas.openxmlformats.org/drawingml/2006/chart" xmlns:r="http://schemas.openxmlformats.org/officeDocument/2006/relationships" r:id="rId2"/>
-          </a:graphicData>
-        </a:graphic>
-      </p:graphicFrame>
     </p:spTree>
   </p:cSld>
 </p:sld>
@@ -9600,7 +8718,7 @@
                 </a:solidFill>
                 <a:latin typeface="Calibri Light"/>
               </a:rPr>
-              <a:t>Conclusions</a:t>
+              <a:t>Public case</a:t>
             </a:r>
             <a:endParaRPr/>
           </a:p>
@@ -9614,112 +8732,29 @@
         </p:nvSpPr>
         <p:spPr>
           <a:xfrm>
-            <a:off x="1097280" y="1845720"/>
-            <a:ext cx="10058040" cy="4023000"/>
-          </a:xfrm>
-          <a:prstGeom prst="rect">
-            <a:avLst/>
-          </a:prstGeom>
-        </p:spPr>
-        <p:txBody>
-          <a:bodyPr lIns="0" rIns="0"/>
+            <a:off x="1097280" y="1846080"/>
+            <a:ext cx="4937400" cy="735840"/>
+          </a:xfrm>
+          <a:prstGeom prst="rect">
+            <a:avLst/>
+          </a:prstGeom>
+        </p:spPr>
+        <p:txBody>
+          <a:bodyPr anchor="ctr"/>
           <a:p>
             <a:pPr>
               <a:lnSpc>
-                <a:spcPct val="90000"/>
-              </a:lnSpc>
-            </a:pPr>
-            <a:endParaRPr/>
-          </a:p>
-          <a:p>
-            <a:pPr lvl="1">
-              <a:lnSpc>
                 <a:spcPct val="100000"/>
               </a:lnSpc>
-              <a:buFont typeface="Calibri"/>
-              <a:buChar char="◦"/>
-            </a:pPr>
-            <a:r>
-              <a:rPr lang="en-US">
-                <a:solidFill>
-                  <a:srgbClr val="404040"/>
-                </a:solidFill>
-                <a:latin typeface="Calibri"/>
-              </a:rPr>
-              <a:t>Basic private algorithms achieve good performance if tuned appropriately</a:t>
-            </a:r>
-            <a:endParaRPr/>
-          </a:p>
-          <a:p>
-            <a:endParaRPr/>
-          </a:p>
-          <a:p>
-            <a:pPr lvl="1">
-              <a:lnSpc>
-                <a:spcPct val="100000"/>
-              </a:lnSpc>
-              <a:buFont typeface="Calibri"/>
-              <a:buChar char="◦"/>
-            </a:pPr>
-            <a:r>
-              <a:rPr lang="en-US">
-                <a:solidFill>
-                  <a:srgbClr val="404040"/>
-                </a:solidFill>
-                <a:latin typeface="Calibri"/>
-              </a:rPr>
-              <a:t>Communication among agents adds complexity but yields better results with more robustness</a:t>
-            </a:r>
-            <a:endParaRPr/>
-          </a:p>
-          <a:p>
-            <a:pPr>
-              <a:lnSpc>
-                <a:spcPct val="90000"/>
-              </a:lnSpc>
-            </a:pPr>
-            <a:endParaRPr/>
-          </a:p>
-          <a:p>
-            <a:pPr>
-              <a:lnSpc>
-                <a:spcPct val="90000"/>
-              </a:lnSpc>
-            </a:pPr>
-            <a:endParaRPr/>
-          </a:p>
-          <a:p>
-            <a:pPr>
-              <a:lnSpc>
-                <a:spcPct val="90000"/>
-              </a:lnSpc>
-            </a:pPr>
-            <a:endParaRPr/>
-          </a:p>
-          <a:p>
-            <a:pPr>
-              <a:lnSpc>
-                <a:spcPct val="90000"/>
-              </a:lnSpc>
-            </a:pPr>
-            <a:endParaRPr/>
-          </a:p>
-          <a:p>
-            <a:pPr lvl="1">
-              <a:lnSpc>
-                <a:spcPct val="100000"/>
-              </a:lnSpc>
-              <a:buFont typeface="Calibri"/>
-              <a:buChar char="◦"/>
-            </a:pPr>
-            <a:r>
-              <a:rPr lang="en-US">
-                <a:solidFill>
-                  <a:srgbClr val="404040"/>
-                </a:solidFill>
-                <a:latin typeface="Calibri"/>
-              </a:rPr>
-              <a:t>PSO to optimize the weights and communication range in the public case</a:t>
+            </a:pPr>
+            <a:r>
+              <a:rPr lang="en-US" sz="2000">
+                <a:solidFill>
+                  <a:srgbClr val="637052"/>
+                </a:solidFill>
+                <a:latin typeface="Calibri"/>
+              </a:rPr>
+              <a:t>Metric 1 (event/time)</a:t>
             </a:r>
             <a:endParaRPr/>
           </a:p>
@@ -9733,29 +8768,29 @@
         </p:nvSpPr>
         <p:spPr>
           <a:xfrm>
-            <a:off x="0" y="0"/>
-            <a:ext cx="-11796840" cy="-11796840"/>
-          </a:xfrm>
-          <a:prstGeom prst="rect">
-            <a:avLst/>
-          </a:prstGeom>
-        </p:spPr>
-        <p:txBody>
-          <a:bodyPr bIns="45000" lIns="90000" rIns="90000" tIns="45000"/>
-          <a:p>
-            <a:pPr>
+            <a:off x="6217920" y="1846080"/>
+            <a:ext cx="4937400" cy="735840"/>
+          </a:xfrm>
+          <a:prstGeom prst="rect">
+            <a:avLst/>
+          </a:prstGeom>
+        </p:spPr>
+        <p:txBody>
+          <a:bodyPr anchor="ctr"/>
+          <a:p>
+            <a:pPr algn="ctr">
               <a:lnSpc>
                 <a:spcPct val="100000"/>
               </a:lnSpc>
             </a:pPr>
             <a:r>
-              <a:rPr lang="en-US">
-                <a:solidFill>
-                  <a:srgbClr val="000000"/>
-                </a:solidFill>
-                <a:latin typeface="Calibri"/>
-              </a:rPr>
-              <a:t>15/12/2015</a:t>
+              <a:rPr lang="en-US" sz="2000">
+                <a:solidFill>
+                  <a:srgbClr val="637052"/>
+                </a:solidFill>
+                <a:latin typeface="Calibri"/>
+              </a:rPr>
+              <a:t>Metric 2 (distance/event)</a:t>
             </a:r>
             <a:endParaRPr/>
           </a:p>
@@ -9791,7 +8826,7 @@
                 </a:solidFill>
                 <a:latin typeface="Calibri"/>
               </a:rPr>
-              <a:t>DIS Project</a:t>
+              <a:t>15/12/2015</a:t>
             </a:r>
             <a:endParaRPr/>
           </a:p>
@@ -9820,7 +8855,401 @@
                 <a:spcPct val="100000"/>
               </a:lnSpc>
             </a:pPr>
-            <a:fld id="{51617101-B131-4111-8101-A1511191C171}" type="slidenum">
+            <a:r>
+              <a:rPr lang="en-US">
+                <a:solidFill>
+                  <a:srgbClr val="000000"/>
+                </a:solidFill>
+                <a:latin typeface="Calibri"/>
+              </a:rPr>
+              <a:t>DIS Project</a:t>
+            </a:r>
+            <a:endParaRPr/>
+          </a:p>
+        </p:txBody>
+      </p:sp>
+      <p:sp>
+        <p:nvSpPr>
+          <p:cNvPr id="222" name="TextShape 6"/>
+          <p:cNvSpPr txBox="1"/>
+          <p:nvPr/>
+        </p:nvSpPr>
+        <p:spPr>
+          <a:xfrm>
+            <a:off x="0" y="0"/>
+            <a:ext cx="-11796840" cy="-11796840"/>
+          </a:xfrm>
+          <a:prstGeom prst="rect">
+            <a:avLst/>
+          </a:prstGeom>
+        </p:spPr>
+        <p:txBody>
+          <a:bodyPr bIns="45000" lIns="90000" rIns="90000" tIns="45000"/>
+          <a:p>
+            <a:pPr>
+              <a:lnSpc>
+                <a:spcPct val="100000"/>
+              </a:lnSpc>
+            </a:pPr>
+            <a:fld id="{C1418171-E131-41D1-B1E1-3191F171B1A1}" type="slidenum">
+              <a:rPr lang="en-US">
+                <a:solidFill>
+                  <a:srgbClr val="000000"/>
+                </a:solidFill>
+                <a:latin typeface="Calibri"/>
+              </a:rPr>
+              <a:t>&lt;number&gt;</a:t>
+            </a:fld>
+            <a:endParaRPr/>
+          </a:p>
+        </p:txBody>
+      </p:sp>
+      <p:pic>
+        <p:nvPicPr>
+          <p:cNvPr descr="" id="223" name=""/>
+          <p:cNvPicPr/>
+          <p:nvPr/>
+        </p:nvPicPr>
+        <p:blipFill>
+          <a:blip r:embed="rId1"/>
+          <a:stretch>
+            <a:fillRect/>
+          </a:stretch>
+        </p:blipFill>
+        <p:spPr>
+          <a:xfrm>
+            <a:off x="640080" y="2736000"/>
+            <a:ext cx="5482080" cy="2750400"/>
+          </a:xfrm>
+          <a:prstGeom prst="rect">
+            <a:avLst/>
+          </a:prstGeom>
+        </p:spPr>
+      </p:pic>
+      <p:pic>
+        <p:nvPicPr>
+          <p:cNvPr descr="" id="224" name=""/>
+          <p:cNvPicPr/>
+          <p:nvPr/>
+        </p:nvPicPr>
+        <p:blipFill>
+          <a:blip r:embed="rId2"/>
+          <a:stretch>
+            <a:fillRect/>
+          </a:stretch>
+        </p:blipFill>
+        <p:spPr>
+          <a:xfrm>
+            <a:off x="6249960" y="2740680"/>
+            <a:ext cx="5482080" cy="2741040"/>
+          </a:xfrm>
+          <a:prstGeom prst="rect">
+            <a:avLst/>
+          </a:prstGeom>
+        </p:spPr>
+      </p:pic>
+    </p:spTree>
+  </p:cSld>
+  <p:timing>
+    <p:tnLst>
+      <p:par>
+        <p:cTn dur="indefinite" id="11" nodeType="tmRoot" restart="never">
+          <p:childTnLst>
+            <p:seq>
+              <p:cTn id="12" nodeType="mainSeq">
+                <p:childTnLst/>
+              </p:cTn>
+              <p:prevCondLst>
+                <p:cond delay="0" evt="onPrev">
+                  <p:tgtEl>
+                    <p:sldTgt/>
+                  </p:tgtEl>
+                </p:cond>
+              </p:prevCondLst>
+              <p:nextCondLst>
+                <p:cond delay="0" evt="onNext">
+                  <p:tgtEl>
+                    <p:sldTgt/>
+                  </p:tgtEl>
+                </p:cond>
+              </p:nextCondLst>
+            </p:seq>
+          </p:childTnLst>
+        </p:cTn>
+      </p:par>
+    </p:tnLst>
+  </p:timing>
+</p:sld>
+</file>
+
+<file path=ppt/slides/slide16.xml><?xml version="1.0" encoding="utf-8"?>
+<p:sld xmlns:a="http://schemas.openxmlformats.org/drawingml/2006/main" xmlns:p="http://schemas.openxmlformats.org/presentationml/2006/main" xmlns:r="http://schemas.openxmlformats.org/officeDocument/2006/relationships">
+  <p:cSld>
+    <p:spTree>
+      <p:nvGrpSpPr>
+        <p:cNvPr id="1" name=""/>
+        <p:cNvGrpSpPr/>
+        <p:nvPr/>
+      </p:nvGrpSpPr>
+      <p:grpSpPr>
+        <a:xfrm>
+          <a:off x="0" y="0"/>
+          <a:ext cx="0" cy="0"/>
+          <a:chOff x="0" y="0"/>
+          <a:chExt cx="0" cy="0"/>
+        </a:xfrm>
+      </p:grpSpPr>
+      <p:sp>
+        <p:nvSpPr>
+          <p:cNvPr id="225" name="TextShape 1"/>
+          <p:cNvSpPr txBox="1"/>
+          <p:nvPr/>
+        </p:nvSpPr>
+        <p:spPr>
+          <a:xfrm>
+            <a:off x="1097280" y="286560"/>
+            <a:ext cx="10058040" cy="1450440"/>
+          </a:xfrm>
+          <a:prstGeom prst="rect">
+            <a:avLst/>
+          </a:prstGeom>
+        </p:spPr>
+        <p:txBody>
+          <a:bodyPr anchor="b"/>
+          <a:p>
+            <a:pPr>
+              <a:lnSpc>
+                <a:spcPct val="85000"/>
+              </a:lnSpc>
+            </a:pPr>
+            <a:r>
+              <a:rPr lang="en-US" sz="4800">
+                <a:solidFill>
+                  <a:srgbClr val="404040"/>
+                </a:solidFill>
+                <a:latin typeface="Calibri Light"/>
+              </a:rPr>
+              <a:t>Conclusions</a:t>
+            </a:r>
+            <a:endParaRPr/>
+          </a:p>
+        </p:txBody>
+      </p:sp>
+      <p:sp>
+        <p:nvSpPr>
+          <p:cNvPr id="226" name="TextShape 2"/>
+          <p:cNvSpPr txBox="1"/>
+          <p:nvPr/>
+        </p:nvSpPr>
+        <p:spPr>
+          <a:xfrm>
+            <a:off x="1097280" y="1845720"/>
+            <a:ext cx="10058040" cy="4023000"/>
+          </a:xfrm>
+          <a:prstGeom prst="rect">
+            <a:avLst/>
+          </a:prstGeom>
+        </p:spPr>
+        <p:txBody>
+          <a:bodyPr lIns="0" rIns="0"/>
+          <a:p>
+            <a:pPr>
+              <a:lnSpc>
+                <a:spcPct val="90000"/>
+              </a:lnSpc>
+            </a:pPr>
+            <a:endParaRPr/>
+          </a:p>
+          <a:p>
+            <a:pPr lvl="1">
+              <a:lnSpc>
+                <a:spcPct val="100000"/>
+              </a:lnSpc>
+              <a:buFont typeface="Calibri"/>
+              <a:buChar char="◦"/>
+            </a:pPr>
+            <a:r>
+              <a:rPr lang="en-US">
+                <a:solidFill>
+                  <a:srgbClr val="404040"/>
+                </a:solidFill>
+                <a:latin typeface="Calibri"/>
+              </a:rPr>
+              <a:t>Basic private algorithms achieve good performance if tuned appropriately</a:t>
+            </a:r>
+            <a:endParaRPr/>
+          </a:p>
+          <a:p>
+            <a:endParaRPr/>
+          </a:p>
+          <a:p>
+            <a:pPr lvl="1">
+              <a:lnSpc>
+                <a:spcPct val="100000"/>
+              </a:lnSpc>
+              <a:buFont typeface="Calibri"/>
+              <a:buChar char="◦"/>
+            </a:pPr>
+            <a:r>
+              <a:rPr lang="en-US">
+                <a:solidFill>
+                  <a:srgbClr val="404040"/>
+                </a:solidFill>
+                <a:latin typeface="Calibri"/>
+              </a:rPr>
+              <a:t>Communication among agents adds complexity but yields better results with more robustness</a:t>
+            </a:r>
+            <a:endParaRPr/>
+          </a:p>
+          <a:p>
+            <a:pPr>
+              <a:lnSpc>
+                <a:spcPct val="90000"/>
+              </a:lnSpc>
+            </a:pPr>
+            <a:endParaRPr/>
+          </a:p>
+          <a:p>
+            <a:pPr>
+              <a:lnSpc>
+                <a:spcPct val="90000"/>
+              </a:lnSpc>
+            </a:pPr>
+            <a:endParaRPr/>
+          </a:p>
+          <a:p>
+            <a:pPr>
+              <a:lnSpc>
+                <a:spcPct val="90000"/>
+              </a:lnSpc>
+            </a:pPr>
+            <a:endParaRPr/>
+          </a:p>
+          <a:p>
+            <a:pPr>
+              <a:lnSpc>
+                <a:spcPct val="90000"/>
+              </a:lnSpc>
+            </a:pPr>
+            <a:endParaRPr/>
+          </a:p>
+          <a:p>
+            <a:pPr lvl="1">
+              <a:lnSpc>
+                <a:spcPct val="100000"/>
+              </a:lnSpc>
+              <a:buFont typeface="Calibri"/>
+              <a:buChar char="◦"/>
+            </a:pPr>
+            <a:r>
+              <a:rPr lang="en-US">
+                <a:solidFill>
+                  <a:srgbClr val="404040"/>
+                </a:solidFill>
+                <a:latin typeface="Calibri"/>
+              </a:rPr>
+              <a:t>PSO to optimize the weights and communication range in the public case</a:t>
+            </a:r>
+            <a:endParaRPr/>
+          </a:p>
+        </p:txBody>
+      </p:sp>
+      <p:sp>
+        <p:nvSpPr>
+          <p:cNvPr id="227" name="TextShape 3"/>
+          <p:cNvSpPr txBox="1"/>
+          <p:nvPr/>
+        </p:nvSpPr>
+        <p:spPr>
+          <a:xfrm>
+            <a:off x="0" y="0"/>
+            <a:ext cx="-11796840" cy="-11796840"/>
+          </a:xfrm>
+          <a:prstGeom prst="rect">
+            <a:avLst/>
+          </a:prstGeom>
+        </p:spPr>
+        <p:txBody>
+          <a:bodyPr bIns="45000" lIns="90000" rIns="90000" tIns="45000"/>
+          <a:p>
+            <a:pPr>
+              <a:lnSpc>
+                <a:spcPct val="100000"/>
+              </a:lnSpc>
+            </a:pPr>
+            <a:r>
+              <a:rPr lang="en-US">
+                <a:solidFill>
+                  <a:srgbClr val="000000"/>
+                </a:solidFill>
+                <a:latin typeface="Calibri"/>
+              </a:rPr>
+              <a:t>15/12/2015</a:t>
+            </a:r>
+            <a:endParaRPr/>
+          </a:p>
+        </p:txBody>
+      </p:sp>
+      <p:sp>
+        <p:nvSpPr>
+          <p:cNvPr id="228" name="TextShape 4"/>
+          <p:cNvSpPr txBox="1"/>
+          <p:nvPr/>
+        </p:nvSpPr>
+        <p:spPr>
+          <a:xfrm>
+            <a:off x="0" y="0"/>
+            <a:ext cx="-11796840" cy="-11796840"/>
+          </a:xfrm>
+          <a:prstGeom prst="rect">
+            <a:avLst/>
+          </a:prstGeom>
+        </p:spPr>
+        <p:txBody>
+          <a:bodyPr bIns="45000" lIns="90000" rIns="90000" tIns="45000"/>
+          <a:p>
+            <a:pPr>
+              <a:lnSpc>
+                <a:spcPct val="100000"/>
+              </a:lnSpc>
+            </a:pPr>
+            <a:r>
+              <a:rPr lang="en-US">
+                <a:solidFill>
+                  <a:srgbClr val="000000"/>
+                </a:solidFill>
+                <a:latin typeface="Calibri"/>
+              </a:rPr>
+              <a:t>DIS Project</a:t>
+            </a:r>
+            <a:endParaRPr/>
+          </a:p>
+        </p:txBody>
+      </p:sp>
+      <p:sp>
+        <p:nvSpPr>
+          <p:cNvPr id="229" name="TextShape 5"/>
+          <p:cNvSpPr txBox="1"/>
+          <p:nvPr/>
+        </p:nvSpPr>
+        <p:spPr>
+          <a:xfrm>
+            <a:off x="0" y="0"/>
+            <a:ext cx="-11796840" cy="-11796840"/>
+          </a:xfrm>
+          <a:prstGeom prst="rect">
+            <a:avLst/>
+          </a:prstGeom>
+        </p:spPr>
+        <p:txBody>
+          <a:bodyPr bIns="45000" lIns="90000" rIns="90000" tIns="45000"/>
+          <a:p>
+            <a:pPr>
+              <a:lnSpc>
+                <a:spcPct val="100000"/>
+              </a:lnSpc>
+            </a:pPr>
+            <a:fld id="{A1004101-3111-4171-8141-51D131713191}" type="slidenum">
               <a:rPr lang="en-US">
                 <a:solidFill>
                   <a:srgbClr val="000000"/>
@@ -10122,7 +9551,7 @@
                 <a:spcPct val="100000"/>
               </a:lnSpc>
             </a:pPr>
-            <a:fld id="{8141E131-C181-41A1-91D1-519181717171}" type="slidenum">
+            <a:fld id="{1101F1E1-41B1-41C1-A1B1-E1A1D1618121}" type="slidenum">
               <a:rPr lang="en-US">
                 <a:solidFill>
                   <a:srgbClr val="000000"/>
@@ -10492,7 +9921,7 @@
                 <a:spcPct val="100000"/>
               </a:lnSpc>
             </a:pPr>
-            <a:fld id="{A1A171C1-2121-41C1-9131-01B161B15121}" type="slidenum">
+            <a:fld id="{D11131F1-E1E1-4101-8161-6141E161E1D1}" type="slidenum">
               <a:rPr lang="en-US">
                 <a:solidFill>
                   <a:srgbClr val="000000"/>
@@ -10885,7 +10314,7 @@
                 <a:spcPct val="100000"/>
               </a:lnSpc>
             </a:pPr>
-            <a:fld id="{5141D1A1-21C1-41C1-81F1-8141B1A13161}" type="slidenum">
+            <a:fld id="{91411101-8191-4151-9111-81E1919161D1}" type="slidenum">
               <a:rPr lang="en-US">
                 <a:solidFill>
                   <a:srgbClr val="000000"/>
@@ -11130,7 +10559,7 @@
                 <a:spcPct val="100000"/>
               </a:lnSpc>
             </a:pPr>
-            <a:fld id="{E1F161F1-4141-41A1-8161-01A1F14181B1}" type="slidenum">
+            <a:fld id="{01B1F1A1-91B1-4101-B161-91F1A171B191}" type="slidenum">
               <a:rPr lang="en-US">
                 <a:solidFill>
                   <a:srgbClr val="000000"/>
@@ -11372,7 +10801,7 @@
                 <a:spcPct val="100000"/>
               </a:lnSpc>
             </a:pPr>
-            <a:fld id="{11A161B1-5141-4101-91C1-0191E19191F1}" type="slidenum">
+            <a:fld id="{A1613171-1191-4141-B1E1-81E131414111}" type="slidenum">
               <a:rPr lang="en-US">
                 <a:solidFill>
                   <a:srgbClr val="000000"/>
@@ -11680,7 +11109,7 @@
                 <a:spcPct val="100000"/>
               </a:lnSpc>
             </a:pPr>
-            <a:fld id="{3171D1E1-0141-4111-A121-F19141B151C1}" type="slidenum">
+            <a:fld id="{0121C151-F151-41B1-B161-A14131314191}" type="slidenum">
               <a:rPr lang="en-US">
                 <a:solidFill>
                   <a:srgbClr val="000000"/>
@@ -11790,7 +11219,7 @@
                 </a:solidFill>
                 <a:latin typeface="Calibri"/>
               </a:rPr>
-              <a:t>Metric 1</a:t>
+              <a:t>Metric 1 (event/time)</a:t>
             </a:r>
             <a:endParaRPr/>
           </a:p>
@@ -11804,7 +11233,7 @@
         </p:nvSpPr>
         <p:spPr>
           <a:xfrm>
-            <a:off x="6217920" y="1846080"/>
+            <a:off x="6217560" y="1847160"/>
             <a:ext cx="4937400" cy="735840"/>
           </a:xfrm>
           <a:prstGeom prst="rect">
@@ -11814,7 +11243,7 @@
         <p:txBody>
           <a:bodyPr anchor="ctr"/>
           <a:p>
-            <a:pPr algn="ctr">
+            <a:pPr>
               <a:lnSpc>
                 <a:spcPct val="100000"/>
               </a:lnSpc>
@@ -11826,7 +11255,7 @@
                 </a:solidFill>
                 <a:latin typeface="Calibri"/>
               </a:rPr>
-              <a:t>Metric 2</a:t>
+              <a:t>Metric 2 (distance/event)</a:t>
             </a:r>
             <a:endParaRPr/>
           </a:p>
@@ -11927,7 +11356,7 @@
                 <a:spcPct val="100000"/>
               </a:lnSpc>
             </a:pPr>
-            <a:fld id="{C16101A1-A101-4161-9181-410151B1B111}" type="slidenum">
+            <a:fld id="{31C15171-C1F1-4131-B111-A1016141F1E1}" type="slidenum">
               <a:rPr lang="en-US">
                 <a:solidFill>
                   <a:srgbClr val="000000"/>
@@ -11940,40 +11369,81 @@
           </a:p>
         </p:txBody>
       </p:sp>
-      <p:graphicFrame>
-        <p:nvGraphicFramePr>
-          <p:cNvPr id="175" name="Espace réservé du contenu 11"/>
-          <p:cNvGraphicFramePr/>
+      <p:pic>
+        <p:nvPicPr>
+          <p:cNvPr descr="" id="175" name=""/>
+          <p:cNvPicPr/>
           <p:nvPr/>
-        </p:nvGraphicFramePr>
-        <p:xfrm>
-          <a:off x="1096920" y="2583000"/>
-          <a:ext cx="4938480" cy="3377880"/>
-        </p:xfrm>
-        <a:graphic>
-          <a:graphicData uri="http://schemas.openxmlformats.org/drawingml/2006/chart">
-            <c:chart xmlns:c="http://schemas.openxmlformats.org/drawingml/2006/chart" xmlns:r="http://schemas.openxmlformats.org/officeDocument/2006/relationships" r:id="rId1"/>
-          </a:graphicData>
-        </a:graphic>
-      </p:graphicFrame>
-      <p:graphicFrame>
-        <p:nvGraphicFramePr>
-          <p:cNvPr id="176" name="Espace réservé du contenu 12"/>
-          <p:cNvGraphicFramePr/>
+        </p:nvPicPr>
+        <p:blipFill>
+          <a:blip r:embed="rId1"/>
+          <a:stretch>
+            <a:fillRect/>
+          </a:stretch>
+        </p:blipFill>
+        <p:spPr>
+          <a:xfrm>
+            <a:off x="6127200" y="2748960"/>
+            <a:ext cx="5394240" cy="2759400"/>
+          </a:xfrm>
+          <a:prstGeom prst="rect">
+            <a:avLst/>
+          </a:prstGeom>
+        </p:spPr>
+      </p:pic>
+      <p:pic>
+        <p:nvPicPr>
+          <p:cNvPr descr="" id="176" name=""/>
+          <p:cNvPicPr/>
           <p:nvPr/>
-        </p:nvGraphicFramePr>
-        <p:xfrm>
-          <a:off x="6218280" y="2583000"/>
-          <a:ext cx="4936680" cy="3377880"/>
-        </p:xfrm>
-        <a:graphic>
-          <a:graphicData uri="http://schemas.openxmlformats.org/drawingml/2006/chart">
-            <c:chart xmlns:c="http://schemas.openxmlformats.org/drawingml/2006/chart" xmlns:r="http://schemas.openxmlformats.org/officeDocument/2006/relationships" r:id="rId2"/>
-          </a:graphicData>
-        </a:graphic>
-      </p:graphicFrame>
+        </p:nvPicPr>
+        <p:blipFill>
+          <a:blip r:embed="rId2"/>
+          <a:stretch>
+            <a:fillRect/>
+          </a:stretch>
+        </p:blipFill>
+        <p:spPr>
+          <a:xfrm>
+            <a:off x="640080" y="2743920"/>
+            <a:ext cx="5394240" cy="2769120"/>
+          </a:xfrm>
+          <a:prstGeom prst="rect">
+            <a:avLst/>
+          </a:prstGeom>
+        </p:spPr>
+      </p:pic>
     </p:spTree>
   </p:cSld>
+  <p:timing>
+    <p:tnLst>
+      <p:par>
+        <p:cTn dur="indefinite" id="3" nodeType="tmRoot" restart="never">
+          <p:childTnLst>
+            <p:seq>
+              <p:cTn id="4" nodeType="mainSeq">
+                <p:childTnLst/>
+              </p:cTn>
+              <p:prevCondLst>
+                <p:cond delay="0" evt="onPrev">
+                  <p:tgtEl>
+                    <p:sldTgt/>
+                  </p:tgtEl>
+                </p:cond>
+              </p:prevCondLst>
+              <p:nextCondLst>
+                <p:cond delay="0" evt="onNext">
+                  <p:tgtEl>
+                    <p:sldTgt/>
+                  </p:tgtEl>
+                </p:cond>
+              </p:nextCondLst>
+            </p:seq>
+          </p:childTnLst>
+        </p:cTn>
+      </p:par>
+    </p:tnLst>
+  </p:timing>
 </p:sld>
 </file>
 
@@ -12163,7 +11633,7 @@
                 <a:spcPct val="100000"/>
               </a:lnSpc>
             </a:pPr>
-            <a:fld id="{E1A1F1C1-C1E1-41D1-8171-0111A1B1E171}" type="slidenum">
+            <a:fld id="{D1212111-4151-4171-B111-3131718101F1}" type="slidenum">
               <a:rPr lang="en-US">
                 <a:solidFill>
                   <a:srgbClr val="000000"/>

</xml_diff>